<commit_message>
flow direction upscaling codes
</commit_message>
<xml_diff>
--- a/FlowDirectionCorrections.pptx
+++ b/FlowDirectionCorrections.pptx
@@ -13,6 +13,11 @@
     <p:sldId id="261" r:id="rId7"/>
     <p:sldId id="258" r:id="rId8"/>
     <p:sldId id="264" r:id="rId9"/>
+    <p:sldId id="265" r:id="rId10"/>
+    <p:sldId id="266" r:id="rId11"/>
+    <p:sldId id="267" r:id="rId12"/>
+    <p:sldId id="268" r:id="rId13"/>
+    <p:sldId id="269" r:id="rId14"/>
   </p:sldIdLst>
   <p:sldSz cx="12192000" cy="6858000"/>
   <p:notesSz cx="6858000" cy="9144000"/>
@@ -161,10 +166,9 @@
           </a:lstStyle>
           <a:p>
             <a:r>
-              <a:rPr lang="en-US" smtClean="0"/>
+              <a:rPr lang="en-US"/>
               <a:t>Click to edit Master title style</a:t>
             </a:r>
-            <a:endParaRPr lang="en-US"/>
           </a:p>
         </p:txBody>
       </p:sp>
@@ -226,10 +230,9 @@
           </a:lstStyle>
           <a:p>
             <a:r>
-              <a:rPr lang="en-US" smtClean="0"/>
+              <a:rPr lang="en-US"/>
               <a:t>Click to edit Master subtitle style</a:t>
             </a:r>
-            <a:endParaRPr lang="en-US"/>
           </a:p>
         </p:txBody>
       </p:sp>
@@ -250,7 +253,7 @@
           <a:p>
             <a:fld id="{C9232B12-A288-3D4F-93FB-1C617921A7C4}" type="datetimeFigureOut">
               <a:rPr lang="en-US" smtClean="0"/>
-              <a:t>9/13/17</a:t>
+              <a:t>6/20/19</a:t>
             </a:fld>
             <a:endParaRPr lang="en-US"/>
           </a:p>
@@ -344,10 +347,9 @@
           <a:lstStyle/>
           <a:p>
             <a:r>
-              <a:rPr lang="en-US" smtClean="0"/>
+              <a:rPr lang="en-US"/>
               <a:t>Click to edit Master title style</a:t>
             </a:r>
-            <a:endParaRPr lang="en-US"/>
           </a:p>
         </p:txBody>
       </p:sp>
@@ -368,38 +370,37 @@
           <a:p>
             <a:pPr lvl="0"/>
             <a:r>
-              <a:rPr lang="en-US" smtClean="0"/>
+              <a:rPr lang="en-US"/>
               <a:t>Click to edit Master text styles</a:t>
             </a:r>
           </a:p>
           <a:p>
             <a:pPr lvl="1"/>
             <a:r>
-              <a:rPr lang="en-US" smtClean="0"/>
+              <a:rPr lang="en-US"/>
               <a:t>Second level</a:t>
             </a:r>
           </a:p>
           <a:p>
             <a:pPr lvl="2"/>
             <a:r>
-              <a:rPr lang="en-US" smtClean="0"/>
+              <a:rPr lang="en-US"/>
               <a:t>Third level</a:t>
             </a:r>
           </a:p>
           <a:p>
             <a:pPr lvl="3"/>
             <a:r>
-              <a:rPr lang="en-US" smtClean="0"/>
+              <a:rPr lang="en-US"/>
               <a:t>Fourth level</a:t>
             </a:r>
           </a:p>
           <a:p>
             <a:pPr lvl="4"/>
             <a:r>
-              <a:rPr lang="en-US" smtClean="0"/>
+              <a:rPr lang="en-US"/>
               <a:t>Fifth level</a:t>
             </a:r>
-            <a:endParaRPr lang="en-US"/>
           </a:p>
         </p:txBody>
       </p:sp>
@@ -420,7 +421,7 @@
           <a:p>
             <a:fld id="{C9232B12-A288-3D4F-93FB-1C617921A7C4}" type="datetimeFigureOut">
               <a:rPr lang="en-US" smtClean="0"/>
-              <a:t>9/13/17</a:t>
+              <a:t>6/20/19</a:t>
             </a:fld>
             <a:endParaRPr lang="en-US"/>
           </a:p>
@@ -519,10 +520,9 @@
           <a:lstStyle/>
           <a:p>
             <a:r>
-              <a:rPr lang="en-US" smtClean="0"/>
+              <a:rPr lang="en-US"/>
               <a:t>Click to edit Master title style</a:t>
             </a:r>
-            <a:endParaRPr lang="en-US"/>
           </a:p>
         </p:txBody>
       </p:sp>
@@ -548,38 +548,37 @@
           <a:p>
             <a:pPr lvl="0"/>
             <a:r>
-              <a:rPr lang="en-US" smtClean="0"/>
+              <a:rPr lang="en-US"/>
               <a:t>Click to edit Master text styles</a:t>
             </a:r>
           </a:p>
           <a:p>
             <a:pPr lvl="1"/>
             <a:r>
-              <a:rPr lang="en-US" smtClean="0"/>
+              <a:rPr lang="en-US"/>
               <a:t>Second level</a:t>
             </a:r>
           </a:p>
           <a:p>
             <a:pPr lvl="2"/>
             <a:r>
-              <a:rPr lang="en-US" smtClean="0"/>
+              <a:rPr lang="en-US"/>
               <a:t>Third level</a:t>
             </a:r>
           </a:p>
           <a:p>
             <a:pPr lvl="3"/>
             <a:r>
-              <a:rPr lang="en-US" smtClean="0"/>
+              <a:rPr lang="en-US"/>
               <a:t>Fourth level</a:t>
             </a:r>
           </a:p>
           <a:p>
             <a:pPr lvl="4"/>
             <a:r>
-              <a:rPr lang="en-US" smtClean="0"/>
+              <a:rPr lang="en-US"/>
               <a:t>Fifth level</a:t>
             </a:r>
-            <a:endParaRPr lang="en-US"/>
           </a:p>
         </p:txBody>
       </p:sp>
@@ -600,7 +599,7 @@
           <a:p>
             <a:fld id="{C9232B12-A288-3D4F-93FB-1C617921A7C4}" type="datetimeFigureOut">
               <a:rPr lang="en-US" smtClean="0"/>
-              <a:t>9/13/17</a:t>
+              <a:t>6/20/19</a:t>
             </a:fld>
             <a:endParaRPr lang="en-US"/>
           </a:p>
@@ -694,10 +693,9 @@
           <a:lstStyle/>
           <a:p>
             <a:r>
-              <a:rPr lang="en-US" smtClean="0"/>
+              <a:rPr lang="en-US"/>
               <a:t>Click to edit Master title style</a:t>
             </a:r>
-            <a:endParaRPr lang="en-US"/>
           </a:p>
         </p:txBody>
       </p:sp>
@@ -718,38 +716,37 @@
           <a:p>
             <a:pPr lvl="0"/>
             <a:r>
-              <a:rPr lang="en-US" smtClean="0"/>
+              <a:rPr lang="en-US"/>
               <a:t>Click to edit Master text styles</a:t>
             </a:r>
           </a:p>
           <a:p>
             <a:pPr lvl="1"/>
             <a:r>
-              <a:rPr lang="en-US" smtClean="0"/>
+              <a:rPr lang="en-US"/>
               <a:t>Second level</a:t>
             </a:r>
           </a:p>
           <a:p>
             <a:pPr lvl="2"/>
             <a:r>
-              <a:rPr lang="en-US" smtClean="0"/>
+              <a:rPr lang="en-US"/>
               <a:t>Third level</a:t>
             </a:r>
           </a:p>
           <a:p>
             <a:pPr lvl="3"/>
             <a:r>
-              <a:rPr lang="en-US" smtClean="0"/>
+              <a:rPr lang="en-US"/>
               <a:t>Fourth level</a:t>
             </a:r>
           </a:p>
           <a:p>
             <a:pPr lvl="4"/>
             <a:r>
-              <a:rPr lang="en-US" smtClean="0"/>
+              <a:rPr lang="en-US"/>
               <a:t>Fifth level</a:t>
             </a:r>
-            <a:endParaRPr lang="en-US"/>
           </a:p>
         </p:txBody>
       </p:sp>
@@ -770,7 +767,7 @@
           <a:p>
             <a:fld id="{C9232B12-A288-3D4F-93FB-1C617921A7C4}" type="datetimeFigureOut">
               <a:rPr lang="en-US" smtClean="0"/>
-              <a:t>9/13/17</a:t>
+              <a:t>6/20/19</a:t>
             </a:fld>
             <a:endParaRPr lang="en-US"/>
           </a:p>
@@ -873,10 +870,9 @@
           </a:lstStyle>
           <a:p>
             <a:r>
-              <a:rPr lang="en-US" smtClean="0"/>
+              <a:rPr lang="en-US"/>
               <a:t>Click to edit Master title style</a:t>
             </a:r>
-            <a:endParaRPr lang="en-US"/>
           </a:p>
         </p:txBody>
       </p:sp>
@@ -993,7 +989,7 @@
           <a:p>
             <a:pPr lvl="0"/>
             <a:r>
-              <a:rPr lang="en-US" smtClean="0"/>
+              <a:rPr lang="en-US"/>
               <a:t>Click to edit Master text styles</a:t>
             </a:r>
           </a:p>
@@ -1016,7 +1012,7 @@
           <a:p>
             <a:fld id="{C9232B12-A288-3D4F-93FB-1C617921A7C4}" type="datetimeFigureOut">
               <a:rPr lang="en-US" smtClean="0"/>
-              <a:t>9/13/17</a:t>
+              <a:t>6/20/19</a:t>
             </a:fld>
             <a:endParaRPr lang="en-US"/>
           </a:p>
@@ -1110,10 +1106,9 @@
           <a:lstStyle/>
           <a:p>
             <a:r>
-              <a:rPr lang="en-US" smtClean="0"/>
+              <a:rPr lang="en-US"/>
               <a:t>Click to edit Master title style</a:t>
             </a:r>
-            <a:endParaRPr lang="en-US"/>
           </a:p>
         </p:txBody>
       </p:sp>
@@ -1139,38 +1134,37 @@
           <a:p>
             <a:pPr lvl="0"/>
             <a:r>
-              <a:rPr lang="en-US" smtClean="0"/>
+              <a:rPr lang="en-US"/>
               <a:t>Click to edit Master text styles</a:t>
             </a:r>
           </a:p>
           <a:p>
             <a:pPr lvl="1"/>
             <a:r>
-              <a:rPr lang="en-US" smtClean="0"/>
+              <a:rPr lang="en-US"/>
               <a:t>Second level</a:t>
             </a:r>
           </a:p>
           <a:p>
             <a:pPr lvl="2"/>
             <a:r>
-              <a:rPr lang="en-US" smtClean="0"/>
+              <a:rPr lang="en-US"/>
               <a:t>Third level</a:t>
             </a:r>
           </a:p>
           <a:p>
             <a:pPr lvl="3"/>
             <a:r>
-              <a:rPr lang="en-US" smtClean="0"/>
+              <a:rPr lang="en-US"/>
               <a:t>Fourth level</a:t>
             </a:r>
           </a:p>
           <a:p>
             <a:pPr lvl="4"/>
             <a:r>
-              <a:rPr lang="en-US" smtClean="0"/>
+              <a:rPr lang="en-US"/>
               <a:t>Fifth level</a:t>
             </a:r>
-            <a:endParaRPr lang="en-US"/>
           </a:p>
         </p:txBody>
       </p:sp>
@@ -1196,38 +1190,37 @@
           <a:p>
             <a:pPr lvl="0"/>
             <a:r>
-              <a:rPr lang="en-US" smtClean="0"/>
+              <a:rPr lang="en-US"/>
               <a:t>Click to edit Master text styles</a:t>
             </a:r>
           </a:p>
           <a:p>
             <a:pPr lvl="1"/>
             <a:r>
-              <a:rPr lang="en-US" smtClean="0"/>
+              <a:rPr lang="en-US"/>
               <a:t>Second level</a:t>
             </a:r>
           </a:p>
           <a:p>
             <a:pPr lvl="2"/>
             <a:r>
-              <a:rPr lang="en-US" smtClean="0"/>
+              <a:rPr lang="en-US"/>
               <a:t>Third level</a:t>
             </a:r>
           </a:p>
           <a:p>
             <a:pPr lvl="3"/>
             <a:r>
-              <a:rPr lang="en-US" smtClean="0"/>
+              <a:rPr lang="en-US"/>
               <a:t>Fourth level</a:t>
             </a:r>
           </a:p>
           <a:p>
             <a:pPr lvl="4"/>
             <a:r>
-              <a:rPr lang="en-US" smtClean="0"/>
+              <a:rPr lang="en-US"/>
               <a:t>Fifth level</a:t>
             </a:r>
-            <a:endParaRPr lang="en-US"/>
           </a:p>
         </p:txBody>
       </p:sp>
@@ -1248,7 +1241,7 @@
           <a:p>
             <a:fld id="{C9232B12-A288-3D4F-93FB-1C617921A7C4}" type="datetimeFigureOut">
               <a:rPr lang="en-US" smtClean="0"/>
-              <a:t>9/13/17</a:t>
+              <a:t>6/20/19</a:t>
             </a:fld>
             <a:endParaRPr lang="en-US"/>
           </a:p>
@@ -1347,10 +1340,9 @@
           <a:lstStyle/>
           <a:p>
             <a:r>
-              <a:rPr lang="en-US" smtClean="0"/>
+              <a:rPr lang="en-US"/>
               <a:t>Click to edit Master title style</a:t>
             </a:r>
-            <a:endParaRPr lang="en-US"/>
           </a:p>
         </p:txBody>
       </p:sp>
@@ -1413,7 +1405,7 @@
           <a:p>
             <a:pPr lvl="0"/>
             <a:r>
-              <a:rPr lang="en-US" smtClean="0"/>
+              <a:rPr lang="en-US"/>
               <a:t>Click to edit Master text styles</a:t>
             </a:r>
           </a:p>
@@ -1441,38 +1433,37 @@
           <a:p>
             <a:pPr lvl="0"/>
             <a:r>
-              <a:rPr lang="en-US" smtClean="0"/>
+              <a:rPr lang="en-US"/>
               <a:t>Click to edit Master text styles</a:t>
             </a:r>
           </a:p>
           <a:p>
             <a:pPr lvl="1"/>
             <a:r>
-              <a:rPr lang="en-US" smtClean="0"/>
+              <a:rPr lang="en-US"/>
               <a:t>Second level</a:t>
             </a:r>
           </a:p>
           <a:p>
             <a:pPr lvl="2"/>
             <a:r>
-              <a:rPr lang="en-US" smtClean="0"/>
+              <a:rPr lang="en-US"/>
               <a:t>Third level</a:t>
             </a:r>
           </a:p>
           <a:p>
             <a:pPr lvl="3"/>
             <a:r>
-              <a:rPr lang="en-US" smtClean="0"/>
+              <a:rPr lang="en-US"/>
               <a:t>Fourth level</a:t>
             </a:r>
           </a:p>
           <a:p>
             <a:pPr lvl="4"/>
             <a:r>
-              <a:rPr lang="en-US" smtClean="0"/>
+              <a:rPr lang="en-US"/>
               <a:t>Fifth level</a:t>
             </a:r>
-            <a:endParaRPr lang="en-US"/>
           </a:p>
         </p:txBody>
       </p:sp>
@@ -1535,7 +1526,7 @@
           <a:p>
             <a:pPr lvl="0"/>
             <a:r>
-              <a:rPr lang="en-US" smtClean="0"/>
+              <a:rPr lang="en-US"/>
               <a:t>Click to edit Master text styles</a:t>
             </a:r>
           </a:p>
@@ -1563,38 +1554,37 @@
           <a:p>
             <a:pPr lvl="0"/>
             <a:r>
-              <a:rPr lang="en-US" smtClean="0"/>
+              <a:rPr lang="en-US"/>
               <a:t>Click to edit Master text styles</a:t>
             </a:r>
           </a:p>
           <a:p>
             <a:pPr lvl="1"/>
             <a:r>
-              <a:rPr lang="en-US" smtClean="0"/>
+              <a:rPr lang="en-US"/>
               <a:t>Second level</a:t>
             </a:r>
           </a:p>
           <a:p>
             <a:pPr lvl="2"/>
             <a:r>
-              <a:rPr lang="en-US" smtClean="0"/>
+              <a:rPr lang="en-US"/>
               <a:t>Third level</a:t>
             </a:r>
           </a:p>
           <a:p>
             <a:pPr lvl="3"/>
             <a:r>
-              <a:rPr lang="en-US" smtClean="0"/>
+              <a:rPr lang="en-US"/>
               <a:t>Fourth level</a:t>
             </a:r>
           </a:p>
           <a:p>
             <a:pPr lvl="4"/>
             <a:r>
-              <a:rPr lang="en-US" smtClean="0"/>
+              <a:rPr lang="en-US"/>
               <a:t>Fifth level</a:t>
             </a:r>
-            <a:endParaRPr lang="en-US"/>
           </a:p>
         </p:txBody>
       </p:sp>
@@ -1615,7 +1605,7 @@
           <a:p>
             <a:fld id="{C9232B12-A288-3D4F-93FB-1C617921A7C4}" type="datetimeFigureOut">
               <a:rPr lang="en-US" smtClean="0"/>
-              <a:t>9/13/17</a:t>
+              <a:t>6/20/19</a:t>
             </a:fld>
             <a:endParaRPr lang="en-US"/>
           </a:p>
@@ -1709,10 +1699,9 @@
           <a:lstStyle/>
           <a:p>
             <a:r>
-              <a:rPr lang="en-US" smtClean="0"/>
+              <a:rPr lang="en-US"/>
               <a:t>Click to edit Master title style</a:t>
             </a:r>
-            <a:endParaRPr lang="en-US"/>
           </a:p>
         </p:txBody>
       </p:sp>
@@ -1733,7 +1722,7 @@
           <a:p>
             <a:fld id="{C9232B12-A288-3D4F-93FB-1C617921A7C4}" type="datetimeFigureOut">
               <a:rPr lang="en-US" smtClean="0"/>
-              <a:t>9/13/17</a:t>
+              <a:t>6/20/19</a:t>
             </a:fld>
             <a:endParaRPr lang="en-US"/>
           </a:p>
@@ -1828,7 +1817,7 @@
           <a:p>
             <a:fld id="{C9232B12-A288-3D4F-93FB-1C617921A7C4}" type="datetimeFigureOut">
               <a:rPr lang="en-US" smtClean="0"/>
-              <a:t>9/13/17</a:t>
+              <a:t>6/20/19</a:t>
             </a:fld>
             <a:endParaRPr lang="en-US"/>
           </a:p>
@@ -1931,10 +1920,9 @@
           </a:lstStyle>
           <a:p>
             <a:r>
-              <a:rPr lang="en-US" smtClean="0"/>
+              <a:rPr lang="en-US"/>
               <a:t>Click to edit Master title style</a:t>
             </a:r>
-            <a:endParaRPr lang="en-US"/>
           </a:p>
         </p:txBody>
       </p:sp>
@@ -1988,38 +1976,37 @@
           <a:p>
             <a:pPr lvl="0"/>
             <a:r>
-              <a:rPr lang="en-US" smtClean="0"/>
+              <a:rPr lang="en-US"/>
               <a:t>Click to edit Master text styles</a:t>
             </a:r>
           </a:p>
           <a:p>
             <a:pPr lvl="1"/>
             <a:r>
-              <a:rPr lang="en-US" smtClean="0"/>
+              <a:rPr lang="en-US"/>
               <a:t>Second level</a:t>
             </a:r>
           </a:p>
           <a:p>
             <a:pPr lvl="2"/>
             <a:r>
-              <a:rPr lang="en-US" smtClean="0"/>
+              <a:rPr lang="en-US"/>
               <a:t>Third level</a:t>
             </a:r>
           </a:p>
           <a:p>
             <a:pPr lvl="3"/>
             <a:r>
-              <a:rPr lang="en-US" smtClean="0"/>
+              <a:rPr lang="en-US"/>
               <a:t>Fourth level</a:t>
             </a:r>
           </a:p>
           <a:p>
             <a:pPr lvl="4"/>
             <a:r>
-              <a:rPr lang="en-US" smtClean="0"/>
+              <a:rPr lang="en-US"/>
               <a:t>Fifth level</a:t>
             </a:r>
-            <a:endParaRPr lang="en-US"/>
           </a:p>
         </p:txBody>
       </p:sp>
@@ -2082,7 +2069,7 @@
           <a:p>
             <a:pPr lvl="0"/>
             <a:r>
-              <a:rPr lang="en-US" smtClean="0"/>
+              <a:rPr lang="en-US"/>
               <a:t>Click to edit Master text styles</a:t>
             </a:r>
           </a:p>
@@ -2105,7 +2092,7 @@
           <a:p>
             <a:fld id="{C9232B12-A288-3D4F-93FB-1C617921A7C4}" type="datetimeFigureOut">
               <a:rPr lang="en-US" smtClean="0"/>
-              <a:t>9/13/17</a:t>
+              <a:t>6/20/19</a:t>
             </a:fld>
             <a:endParaRPr lang="en-US"/>
           </a:p>
@@ -2208,10 +2195,9 @@
           </a:lstStyle>
           <a:p>
             <a:r>
-              <a:rPr lang="en-US" smtClean="0"/>
+              <a:rPr lang="en-US"/>
               <a:t>Click to edit Master title style</a:t>
             </a:r>
-            <a:endParaRPr lang="en-US"/>
           </a:p>
         </p:txBody>
       </p:sp>
@@ -2335,7 +2321,7 @@
           <a:p>
             <a:pPr lvl="0"/>
             <a:r>
-              <a:rPr lang="en-US" smtClean="0"/>
+              <a:rPr lang="en-US"/>
               <a:t>Click to edit Master text styles</a:t>
             </a:r>
           </a:p>
@@ -2358,7 +2344,7 @@
           <a:p>
             <a:fld id="{C9232B12-A288-3D4F-93FB-1C617921A7C4}" type="datetimeFigureOut">
               <a:rPr lang="en-US" smtClean="0"/>
-              <a:t>9/13/17</a:t>
+              <a:t>6/20/19</a:t>
             </a:fld>
             <a:endParaRPr lang="en-US"/>
           </a:p>
@@ -2467,10 +2453,9 @@
           <a:lstStyle/>
           <a:p>
             <a:r>
-              <a:rPr lang="en-US" smtClean="0"/>
+              <a:rPr lang="en-US"/>
               <a:t>Click to edit Master title style</a:t>
             </a:r>
-            <a:endParaRPr lang="en-US"/>
           </a:p>
         </p:txBody>
       </p:sp>
@@ -2501,38 +2486,37 @@
           <a:p>
             <a:pPr lvl="0"/>
             <a:r>
-              <a:rPr lang="en-US" smtClean="0"/>
+              <a:rPr lang="en-US"/>
               <a:t>Click to edit Master text styles</a:t>
             </a:r>
           </a:p>
           <a:p>
             <a:pPr lvl="1"/>
             <a:r>
-              <a:rPr lang="en-US" smtClean="0"/>
+              <a:rPr lang="en-US"/>
               <a:t>Second level</a:t>
             </a:r>
           </a:p>
           <a:p>
             <a:pPr lvl="2"/>
             <a:r>
-              <a:rPr lang="en-US" smtClean="0"/>
+              <a:rPr lang="en-US"/>
               <a:t>Third level</a:t>
             </a:r>
           </a:p>
           <a:p>
             <a:pPr lvl="3"/>
             <a:r>
-              <a:rPr lang="en-US" smtClean="0"/>
+              <a:rPr lang="en-US"/>
               <a:t>Fourth level</a:t>
             </a:r>
           </a:p>
           <a:p>
             <a:pPr lvl="4"/>
             <a:r>
-              <a:rPr lang="en-US" smtClean="0"/>
+              <a:rPr lang="en-US"/>
               <a:t>Fifth level</a:t>
             </a:r>
-            <a:endParaRPr lang="en-US"/>
           </a:p>
         </p:txBody>
       </p:sp>
@@ -2571,7 +2555,7 @@
           <a:p>
             <a:fld id="{C9232B12-A288-3D4F-93FB-1C617921A7C4}" type="datetimeFigureOut">
               <a:rPr lang="en-US" smtClean="0"/>
-              <a:t>9/13/17</a:t>
+              <a:t>6/20/19</a:t>
             </a:fld>
             <a:endParaRPr lang="en-US"/>
           </a:p>
@@ -2992,10 +2976,9 @@
           <a:lstStyle/>
           <a:p>
             <a:r>
-              <a:rPr lang="en-US" dirty="0" smtClean="0"/>
+              <a:rPr lang="en-US" dirty="0"/>
               <a:t>Semi-automatic flow direction corrections</a:t>
             </a:r>
-            <a:endParaRPr lang="en-US" dirty="0"/>
           </a:p>
         </p:txBody>
       </p:sp>
@@ -3015,10 +2998,9 @@
           <a:lstStyle/>
           <a:p>
             <a:r>
-              <a:rPr lang="en-US" dirty="0" smtClean="0"/>
+              <a:rPr lang="en-US" dirty="0"/>
               <a:t>Sept. 12, 2017</a:t>
             </a:r>
-            <a:endParaRPr lang="en-US" dirty="0"/>
           </a:p>
         </p:txBody>
       </p:sp>
@@ -3026,6 +3008,2054 @@
     <p:extLst>
       <p:ext uri="{BB962C8B-B14F-4D97-AF65-F5344CB8AC3E}">
         <p14:creationId xmlns:p14="http://schemas.microsoft.com/office/powerpoint/2010/main" val="1636492617"/>
+      </p:ext>
+    </p:extLst>
+  </p:cSld>
+  <p:clrMapOvr>
+    <a:masterClrMapping/>
+  </p:clrMapOvr>
+</p:sld>
+</file>
+
+<file path=ppt/slides/slide10.xml><?xml version="1.0" encoding="utf-8"?>
+<p:sld xmlns:a="http://schemas.openxmlformats.org/drawingml/2006/main" xmlns:r="http://schemas.openxmlformats.org/officeDocument/2006/relationships" xmlns:p="http://schemas.openxmlformats.org/presentationml/2006/main">
+  <p:cSld>
+    <p:spTree>
+      <p:nvGrpSpPr>
+        <p:cNvPr id="1" name=""/>
+        <p:cNvGrpSpPr/>
+        <p:nvPr/>
+      </p:nvGrpSpPr>
+      <p:grpSpPr>
+        <a:xfrm>
+          <a:off x="0" y="0"/>
+          <a:ext cx="0" cy="0"/>
+          <a:chOff x="0" y="0"/>
+          <a:chExt cx="0" cy="0"/>
+        </a:xfrm>
+      </p:grpSpPr>
+      <p:sp>
+        <p:nvSpPr>
+          <p:cNvPr id="2" name="Title 1">
+            <a:extLst>
+              <a:ext uri="{FF2B5EF4-FFF2-40B4-BE49-F238E27FC236}">
+                <a16:creationId xmlns:a16="http://schemas.microsoft.com/office/drawing/2014/main" id="{C00F3E8E-4B7C-C748-9EA9-11C413F247A8}"/>
+              </a:ext>
+            </a:extLst>
+          </p:cNvPr>
+          <p:cNvSpPr>
+            <a:spLocks noGrp="1"/>
+          </p:cNvSpPr>
+          <p:nvPr>
+            <p:ph type="title"/>
+          </p:nvPr>
+        </p:nvSpPr>
+        <p:spPr>
+          <a:xfrm>
+            <a:off x="838200" y="285109"/>
+            <a:ext cx="10515600" cy="588322"/>
+          </a:xfrm>
+        </p:spPr>
+        <p:txBody>
+          <a:bodyPr>
+            <a:normAutofit fontScale="90000"/>
+          </a:bodyPr>
+          <a:lstStyle/>
+          <a:p>
+            <a:r>
+              <a:rPr lang="en-US" dirty="0"/>
+              <a:t>Finding the outlet</a:t>
+            </a:r>
+          </a:p>
+        </p:txBody>
+      </p:sp>
+      <p:pic>
+        <p:nvPicPr>
+          <p:cNvPr id="5" name="Picture 4">
+            <a:extLst>
+              <a:ext uri="{FF2B5EF4-FFF2-40B4-BE49-F238E27FC236}">
+                <a16:creationId xmlns:a16="http://schemas.microsoft.com/office/drawing/2014/main" id="{1409C268-3BD6-754F-9C7B-56EBF3F9C153}"/>
+              </a:ext>
+            </a:extLst>
+          </p:cNvPr>
+          <p:cNvPicPr>
+            <a:picLocks noChangeAspect="1"/>
+          </p:cNvPicPr>
+          <p:nvPr/>
+        </p:nvPicPr>
+        <p:blipFill>
+          <a:blip r:embed="rId2"/>
+          <a:stretch>
+            <a:fillRect/>
+          </a:stretch>
+        </p:blipFill>
+        <p:spPr>
+          <a:xfrm>
+            <a:off x="3045349" y="1528593"/>
+            <a:ext cx="5844443" cy="5257846"/>
+          </a:xfrm>
+          <a:prstGeom prst="rect">
+            <a:avLst/>
+          </a:prstGeom>
+        </p:spPr>
+      </p:pic>
+      <p:sp>
+        <p:nvSpPr>
+          <p:cNvPr id="6" name="TextBox 5">
+            <a:extLst>
+              <a:ext uri="{FF2B5EF4-FFF2-40B4-BE49-F238E27FC236}">
+                <a16:creationId xmlns:a16="http://schemas.microsoft.com/office/drawing/2014/main" id="{D9CC281D-8652-9341-94A2-4B1D4C019692}"/>
+              </a:ext>
+            </a:extLst>
+          </p:cNvPr>
+          <p:cNvSpPr txBox="1"/>
+          <p:nvPr/>
+        </p:nvSpPr>
+        <p:spPr>
+          <a:xfrm>
+            <a:off x="2296834" y="2368422"/>
+            <a:ext cx="1264257" cy="369332"/>
+          </a:xfrm>
+          <a:prstGeom prst="rect">
+            <a:avLst/>
+          </a:prstGeom>
+          <a:noFill/>
+        </p:spPr>
+        <p:txBody>
+          <a:bodyPr wrap="square" rtlCol="0">
+            <a:spAutoFit/>
+          </a:bodyPr>
+          <a:lstStyle/>
+          <a:p>
+            <a:r>
+              <a:rPr lang="en-US" dirty="0"/>
+              <a:t>Indus</a:t>
+            </a:r>
+          </a:p>
+        </p:txBody>
+      </p:sp>
+      <p:sp>
+        <p:nvSpPr>
+          <p:cNvPr id="7" name="TextBox 6">
+            <a:extLst>
+              <a:ext uri="{FF2B5EF4-FFF2-40B4-BE49-F238E27FC236}">
+                <a16:creationId xmlns:a16="http://schemas.microsoft.com/office/drawing/2014/main" id="{0BF26869-3BAE-A44F-A525-7C5959B832CF}"/>
+              </a:ext>
+            </a:extLst>
+          </p:cNvPr>
+          <p:cNvSpPr txBox="1"/>
+          <p:nvPr/>
+        </p:nvSpPr>
+        <p:spPr>
+          <a:xfrm>
+            <a:off x="9138152" y="3804716"/>
+            <a:ext cx="1264257" cy="369332"/>
+          </a:xfrm>
+          <a:prstGeom prst="rect">
+            <a:avLst/>
+          </a:prstGeom>
+          <a:noFill/>
+        </p:spPr>
+        <p:txBody>
+          <a:bodyPr wrap="square" rtlCol="0">
+            <a:spAutoFit/>
+          </a:bodyPr>
+          <a:lstStyle/>
+          <a:p>
+            <a:r>
+              <a:rPr lang="en-US" dirty="0"/>
+              <a:t>Chenab</a:t>
+            </a:r>
+          </a:p>
+        </p:txBody>
+      </p:sp>
+      <p:sp>
+        <p:nvSpPr>
+          <p:cNvPr id="9" name="TextBox 8">
+            <a:extLst>
+              <a:ext uri="{FF2B5EF4-FFF2-40B4-BE49-F238E27FC236}">
+                <a16:creationId xmlns:a16="http://schemas.microsoft.com/office/drawing/2014/main" id="{1F065FCF-203F-D14E-8246-1321D29E0267}"/>
+              </a:ext>
+            </a:extLst>
+          </p:cNvPr>
+          <p:cNvSpPr txBox="1"/>
+          <p:nvPr/>
+        </p:nvSpPr>
+        <p:spPr>
+          <a:xfrm>
+            <a:off x="9138153" y="4829211"/>
+            <a:ext cx="1264257" cy="369332"/>
+          </a:xfrm>
+          <a:prstGeom prst="rect">
+            <a:avLst/>
+          </a:prstGeom>
+          <a:noFill/>
+        </p:spPr>
+        <p:txBody>
+          <a:bodyPr wrap="square" rtlCol="0">
+            <a:spAutoFit/>
+          </a:bodyPr>
+          <a:lstStyle/>
+          <a:p>
+            <a:r>
+              <a:rPr lang="en-US" dirty="0" err="1"/>
+              <a:t>Satluj</a:t>
+            </a:r>
+            <a:endParaRPr lang="en-US" dirty="0"/>
+          </a:p>
+        </p:txBody>
+      </p:sp>
+      <p:cxnSp>
+        <p:nvCxnSpPr>
+          <p:cNvPr id="11" name="Straight Connector 10">
+            <a:extLst>
+              <a:ext uri="{FF2B5EF4-FFF2-40B4-BE49-F238E27FC236}">
+                <a16:creationId xmlns:a16="http://schemas.microsoft.com/office/drawing/2014/main" id="{DCE360DF-6993-524C-BDE4-DE48D791C78D}"/>
+              </a:ext>
+            </a:extLst>
+          </p:cNvPr>
+          <p:cNvCxnSpPr>
+            <a:cxnSpLocks/>
+          </p:cNvCxnSpPr>
+          <p:nvPr/>
+        </p:nvCxnSpPr>
+        <p:spPr>
+          <a:xfrm>
+            <a:off x="2796988" y="2737754"/>
+            <a:ext cx="1826696" cy="1023731"/>
+          </a:xfrm>
+          <a:prstGeom prst="line">
+            <a:avLst/>
+          </a:prstGeom>
+          <a:ln w="12700">
+            <a:tailEnd type="triangle"/>
+          </a:ln>
+        </p:spPr>
+        <p:style>
+          <a:lnRef idx="1">
+            <a:schemeClr val="dk1"/>
+          </a:lnRef>
+          <a:fillRef idx="0">
+            <a:schemeClr val="dk1"/>
+          </a:fillRef>
+          <a:effectRef idx="0">
+            <a:schemeClr val="dk1"/>
+          </a:effectRef>
+          <a:fontRef idx="minor">
+            <a:schemeClr val="tx1"/>
+          </a:fontRef>
+        </p:style>
+      </p:cxnSp>
+      <p:cxnSp>
+        <p:nvCxnSpPr>
+          <p:cNvPr id="13" name="Straight Connector 12">
+            <a:extLst>
+              <a:ext uri="{FF2B5EF4-FFF2-40B4-BE49-F238E27FC236}">
+                <a16:creationId xmlns:a16="http://schemas.microsoft.com/office/drawing/2014/main" id="{00CAB84F-FC30-1442-B491-4B1E40D0802D}"/>
+              </a:ext>
+            </a:extLst>
+          </p:cNvPr>
+          <p:cNvCxnSpPr>
+            <a:cxnSpLocks/>
+            <a:endCxn id="9" idx="1"/>
+          </p:cNvCxnSpPr>
+          <p:nvPr/>
+        </p:nvCxnSpPr>
+        <p:spPr>
+          <a:xfrm>
+            <a:off x="7063096" y="2553088"/>
+            <a:ext cx="2075057" cy="2460789"/>
+          </a:xfrm>
+          <a:prstGeom prst="line">
+            <a:avLst/>
+          </a:prstGeom>
+          <a:ln w="12700">
+            <a:headEnd type="triangle"/>
+          </a:ln>
+        </p:spPr>
+        <p:style>
+          <a:lnRef idx="1">
+            <a:schemeClr val="dk1"/>
+          </a:lnRef>
+          <a:fillRef idx="0">
+            <a:schemeClr val="dk1"/>
+          </a:fillRef>
+          <a:effectRef idx="0">
+            <a:schemeClr val="dk1"/>
+          </a:effectRef>
+          <a:fontRef idx="minor">
+            <a:schemeClr val="tx1"/>
+          </a:fontRef>
+        </p:style>
+      </p:cxnSp>
+      <p:cxnSp>
+        <p:nvCxnSpPr>
+          <p:cNvPr id="15" name="Straight Connector 14">
+            <a:extLst>
+              <a:ext uri="{FF2B5EF4-FFF2-40B4-BE49-F238E27FC236}">
+                <a16:creationId xmlns:a16="http://schemas.microsoft.com/office/drawing/2014/main" id="{43C3C7A6-230B-FD40-B2E0-07E324A047C0}"/>
+              </a:ext>
+            </a:extLst>
+          </p:cNvPr>
+          <p:cNvCxnSpPr>
+            <a:cxnSpLocks/>
+          </p:cNvCxnSpPr>
+          <p:nvPr/>
+        </p:nvCxnSpPr>
+        <p:spPr>
+          <a:xfrm>
+            <a:off x="6992471" y="1909482"/>
+            <a:ext cx="2145680" cy="1941651"/>
+          </a:xfrm>
+          <a:prstGeom prst="line">
+            <a:avLst/>
+          </a:prstGeom>
+          <a:ln w="12700">
+            <a:headEnd type="triangle"/>
+            <a:tailEnd type="none"/>
+          </a:ln>
+        </p:spPr>
+        <p:style>
+          <a:lnRef idx="1">
+            <a:schemeClr val="dk1"/>
+          </a:lnRef>
+          <a:fillRef idx="0">
+            <a:schemeClr val="dk1"/>
+          </a:fillRef>
+          <a:effectRef idx="0">
+            <a:schemeClr val="dk1"/>
+          </a:effectRef>
+          <a:fontRef idx="minor">
+            <a:schemeClr val="tx1"/>
+          </a:fontRef>
+        </p:style>
+      </p:cxnSp>
+      <p:sp>
+        <p:nvSpPr>
+          <p:cNvPr id="17" name="TextBox 16">
+            <a:extLst>
+              <a:ext uri="{FF2B5EF4-FFF2-40B4-BE49-F238E27FC236}">
+                <a16:creationId xmlns:a16="http://schemas.microsoft.com/office/drawing/2014/main" id="{3742F655-3700-0D4E-8A10-5E4AD10D82B7}"/>
+              </a:ext>
+            </a:extLst>
+          </p:cNvPr>
+          <p:cNvSpPr txBox="1"/>
+          <p:nvPr/>
+        </p:nvSpPr>
+        <p:spPr>
+          <a:xfrm>
+            <a:off x="9080604" y="5472817"/>
+            <a:ext cx="1264257" cy="369332"/>
+          </a:xfrm>
+          <a:prstGeom prst="rect">
+            <a:avLst/>
+          </a:prstGeom>
+          <a:noFill/>
+        </p:spPr>
+        <p:txBody>
+          <a:bodyPr wrap="square" rtlCol="0">
+            <a:spAutoFit/>
+          </a:bodyPr>
+          <a:lstStyle/>
+          <a:p>
+            <a:r>
+              <a:rPr lang="en-US" dirty="0" err="1"/>
+              <a:t>Panjnad</a:t>
+            </a:r>
+            <a:endParaRPr lang="en-US" dirty="0"/>
+          </a:p>
+        </p:txBody>
+      </p:sp>
+      <p:cxnSp>
+        <p:nvCxnSpPr>
+          <p:cNvPr id="18" name="Straight Connector 17">
+            <a:extLst>
+              <a:ext uri="{FF2B5EF4-FFF2-40B4-BE49-F238E27FC236}">
+                <a16:creationId xmlns:a16="http://schemas.microsoft.com/office/drawing/2014/main" id="{1C8D9833-3E6F-6340-9B11-AF52BD9F4A7C}"/>
+              </a:ext>
+            </a:extLst>
+          </p:cNvPr>
+          <p:cNvCxnSpPr>
+            <a:cxnSpLocks/>
+          </p:cNvCxnSpPr>
+          <p:nvPr/>
+        </p:nvCxnSpPr>
+        <p:spPr>
+          <a:xfrm>
+            <a:off x="6490447" y="2671482"/>
+            <a:ext cx="2590157" cy="2933043"/>
+          </a:xfrm>
+          <a:prstGeom prst="line">
+            <a:avLst/>
+          </a:prstGeom>
+          <a:ln w="12700">
+            <a:headEnd type="triangle"/>
+            <a:tailEnd type="none"/>
+          </a:ln>
+        </p:spPr>
+        <p:style>
+          <a:lnRef idx="1">
+            <a:schemeClr val="dk1"/>
+          </a:lnRef>
+          <a:fillRef idx="0">
+            <a:schemeClr val="dk1"/>
+          </a:fillRef>
+          <a:effectRef idx="0">
+            <a:schemeClr val="dk1"/>
+          </a:effectRef>
+          <a:fontRef idx="minor">
+            <a:schemeClr val="tx1"/>
+          </a:fontRef>
+        </p:style>
+      </p:cxnSp>
+      <p:sp>
+        <p:nvSpPr>
+          <p:cNvPr id="22" name="TextBox 21">
+            <a:extLst>
+              <a:ext uri="{FF2B5EF4-FFF2-40B4-BE49-F238E27FC236}">
+                <a16:creationId xmlns:a16="http://schemas.microsoft.com/office/drawing/2014/main" id="{82D444A7-6995-524E-9138-DDD675620724}"/>
+              </a:ext>
+            </a:extLst>
+          </p:cNvPr>
+          <p:cNvSpPr txBox="1"/>
+          <p:nvPr/>
+        </p:nvSpPr>
+        <p:spPr>
+          <a:xfrm>
+            <a:off x="2289040" y="5013877"/>
+            <a:ext cx="1264257" cy="646331"/>
+          </a:xfrm>
+          <a:prstGeom prst="rect">
+            <a:avLst/>
+          </a:prstGeom>
+          <a:noFill/>
+        </p:spPr>
+        <p:txBody>
+          <a:bodyPr wrap="square" rtlCol="0">
+            <a:spAutoFit/>
+          </a:bodyPr>
+          <a:lstStyle/>
+          <a:p>
+            <a:r>
+              <a:rPr lang="en-US" dirty="0" err="1"/>
+              <a:t>Kotri</a:t>
+            </a:r>
+            <a:r>
+              <a:rPr lang="en-US" dirty="0"/>
+              <a:t> Barrage</a:t>
+            </a:r>
+          </a:p>
+        </p:txBody>
+      </p:sp>
+      <p:cxnSp>
+        <p:nvCxnSpPr>
+          <p:cNvPr id="23" name="Straight Connector 22">
+            <a:extLst>
+              <a:ext uri="{FF2B5EF4-FFF2-40B4-BE49-F238E27FC236}">
+                <a16:creationId xmlns:a16="http://schemas.microsoft.com/office/drawing/2014/main" id="{00E40D9E-1304-5347-9091-125593D4DDA2}"/>
+              </a:ext>
+            </a:extLst>
+          </p:cNvPr>
+          <p:cNvCxnSpPr>
+            <a:cxnSpLocks/>
+          </p:cNvCxnSpPr>
+          <p:nvPr/>
+        </p:nvCxnSpPr>
+        <p:spPr>
+          <a:xfrm>
+            <a:off x="3007111" y="5203816"/>
+            <a:ext cx="1616573" cy="133226"/>
+          </a:xfrm>
+          <a:prstGeom prst="line">
+            <a:avLst/>
+          </a:prstGeom>
+          <a:ln w="12700">
+            <a:tailEnd type="triangle"/>
+          </a:ln>
+        </p:spPr>
+        <p:style>
+          <a:lnRef idx="1">
+            <a:schemeClr val="dk1"/>
+          </a:lnRef>
+          <a:fillRef idx="0">
+            <a:schemeClr val="dk1"/>
+          </a:fillRef>
+          <a:effectRef idx="0">
+            <a:schemeClr val="dk1"/>
+          </a:effectRef>
+          <a:fontRef idx="minor">
+            <a:schemeClr val="tx1"/>
+          </a:fontRef>
+        </p:style>
+      </p:cxnSp>
+      <p:sp>
+        <p:nvSpPr>
+          <p:cNvPr id="25" name="Rectangle 24">
+            <a:extLst>
+              <a:ext uri="{FF2B5EF4-FFF2-40B4-BE49-F238E27FC236}">
+                <a16:creationId xmlns:a16="http://schemas.microsoft.com/office/drawing/2014/main" id="{07977E60-F0CD-8A47-87A8-5D7FA6EE0263}"/>
+              </a:ext>
+            </a:extLst>
+          </p:cNvPr>
+          <p:cNvSpPr/>
+          <p:nvPr/>
+        </p:nvSpPr>
+        <p:spPr>
+          <a:xfrm>
+            <a:off x="4052046" y="6174730"/>
+            <a:ext cx="276269" cy="279859"/>
+          </a:xfrm>
+          <a:prstGeom prst="rect">
+            <a:avLst/>
+          </a:prstGeom>
+          <a:noFill/>
+          <a:ln w="25400">
+            <a:solidFill>
+              <a:srgbClr val="FF0000"/>
+            </a:solidFill>
+          </a:ln>
+        </p:spPr>
+        <p:style>
+          <a:lnRef idx="2">
+            <a:schemeClr val="accent1">
+              <a:shade val="50000"/>
+            </a:schemeClr>
+          </a:lnRef>
+          <a:fillRef idx="1">
+            <a:schemeClr val="accent1"/>
+          </a:fillRef>
+          <a:effectRef idx="0">
+            <a:schemeClr val="accent1"/>
+          </a:effectRef>
+          <a:fontRef idx="minor">
+            <a:schemeClr val="lt1"/>
+          </a:fontRef>
+        </p:style>
+        <p:txBody>
+          <a:bodyPr rtlCol="0" anchor="ctr"/>
+          <a:lstStyle/>
+          <a:p>
+            <a:pPr algn="ctr"/>
+            <a:endParaRPr lang="en-US"/>
+          </a:p>
+        </p:txBody>
+      </p:sp>
+      <p:sp>
+        <p:nvSpPr>
+          <p:cNvPr id="26" name="Rectangle 25">
+            <a:extLst>
+              <a:ext uri="{FF2B5EF4-FFF2-40B4-BE49-F238E27FC236}">
+                <a16:creationId xmlns:a16="http://schemas.microsoft.com/office/drawing/2014/main" id="{A852AFAB-8864-3B4D-98B6-7D66DCA22436}"/>
+              </a:ext>
+            </a:extLst>
+          </p:cNvPr>
+          <p:cNvSpPr/>
+          <p:nvPr/>
+        </p:nvSpPr>
+        <p:spPr>
+          <a:xfrm>
+            <a:off x="5020235" y="6172991"/>
+            <a:ext cx="277284" cy="281598"/>
+          </a:xfrm>
+          <a:prstGeom prst="rect">
+            <a:avLst/>
+          </a:prstGeom>
+          <a:noFill/>
+          <a:ln w="25400">
+            <a:solidFill>
+              <a:schemeClr val="accent1"/>
+            </a:solidFill>
+          </a:ln>
+        </p:spPr>
+        <p:style>
+          <a:lnRef idx="2">
+            <a:schemeClr val="accent1">
+              <a:shade val="50000"/>
+            </a:schemeClr>
+          </a:lnRef>
+          <a:fillRef idx="1">
+            <a:schemeClr val="accent1"/>
+          </a:fillRef>
+          <a:effectRef idx="0">
+            <a:schemeClr val="accent1"/>
+          </a:effectRef>
+          <a:fontRef idx="minor">
+            <a:schemeClr val="lt1"/>
+          </a:fontRef>
+        </p:style>
+        <p:txBody>
+          <a:bodyPr rtlCol="0" anchor="ctr"/>
+          <a:lstStyle/>
+          <a:p>
+            <a:pPr algn="ctr"/>
+            <a:endParaRPr lang="en-US"/>
+          </a:p>
+        </p:txBody>
+      </p:sp>
+    </p:spTree>
+    <p:extLst>
+      <p:ext uri="{BB962C8B-B14F-4D97-AF65-F5344CB8AC3E}">
+        <p14:creationId xmlns:p14="http://schemas.microsoft.com/office/powerpoint/2010/main" val="2638702709"/>
+      </p:ext>
+    </p:extLst>
+  </p:cSld>
+  <p:clrMapOvr>
+    <a:masterClrMapping/>
+  </p:clrMapOvr>
+</p:sld>
+</file>
+
+<file path=ppt/slides/slide11.xml><?xml version="1.0" encoding="utf-8"?>
+<p:sld xmlns:a="http://schemas.openxmlformats.org/drawingml/2006/main" xmlns:r="http://schemas.openxmlformats.org/officeDocument/2006/relationships" xmlns:p="http://schemas.openxmlformats.org/presentationml/2006/main">
+  <p:cSld>
+    <p:spTree>
+      <p:nvGrpSpPr>
+        <p:cNvPr id="1" name=""/>
+        <p:cNvGrpSpPr/>
+        <p:nvPr/>
+      </p:nvGrpSpPr>
+      <p:grpSpPr>
+        <a:xfrm>
+          <a:off x="0" y="0"/>
+          <a:ext cx="0" cy="0"/>
+          <a:chOff x="0" y="0"/>
+          <a:chExt cx="0" cy="0"/>
+        </a:xfrm>
+      </p:grpSpPr>
+      <p:sp>
+        <p:nvSpPr>
+          <p:cNvPr id="2" name="Title 1">
+            <a:extLst>
+              <a:ext uri="{FF2B5EF4-FFF2-40B4-BE49-F238E27FC236}">
+                <a16:creationId xmlns:a16="http://schemas.microsoft.com/office/drawing/2014/main" id="{C00F3E8E-4B7C-C748-9EA9-11C413F247A8}"/>
+              </a:ext>
+            </a:extLst>
+          </p:cNvPr>
+          <p:cNvSpPr>
+            <a:spLocks noGrp="1"/>
+          </p:cNvSpPr>
+          <p:nvPr>
+            <p:ph type="title"/>
+          </p:nvPr>
+        </p:nvSpPr>
+        <p:spPr>
+          <a:xfrm>
+            <a:off x="838200" y="285109"/>
+            <a:ext cx="10515600" cy="588322"/>
+          </a:xfrm>
+        </p:spPr>
+        <p:txBody>
+          <a:bodyPr>
+            <a:normAutofit fontScale="90000"/>
+          </a:bodyPr>
+          <a:lstStyle/>
+          <a:p>
+            <a:r>
+              <a:rPr lang="en-US" dirty="0"/>
+              <a:t>Finding the outlet</a:t>
+            </a:r>
+          </a:p>
+        </p:txBody>
+      </p:sp>
+      <p:pic>
+        <p:nvPicPr>
+          <p:cNvPr id="5" name="Picture 4">
+            <a:extLst>
+              <a:ext uri="{FF2B5EF4-FFF2-40B4-BE49-F238E27FC236}">
+                <a16:creationId xmlns:a16="http://schemas.microsoft.com/office/drawing/2014/main" id="{1409C268-3BD6-754F-9C7B-56EBF3F9C153}"/>
+              </a:ext>
+            </a:extLst>
+          </p:cNvPr>
+          <p:cNvPicPr>
+            <a:picLocks noChangeAspect="1"/>
+          </p:cNvPicPr>
+          <p:nvPr/>
+        </p:nvPicPr>
+        <p:blipFill>
+          <a:blip r:embed="rId2"/>
+          <a:stretch>
+            <a:fillRect/>
+          </a:stretch>
+        </p:blipFill>
+        <p:spPr>
+          <a:xfrm>
+            <a:off x="3045349" y="1636057"/>
+            <a:ext cx="5844443" cy="5042919"/>
+          </a:xfrm>
+          <a:prstGeom prst="rect">
+            <a:avLst/>
+          </a:prstGeom>
+        </p:spPr>
+      </p:pic>
+      <p:sp>
+        <p:nvSpPr>
+          <p:cNvPr id="6" name="TextBox 5">
+            <a:extLst>
+              <a:ext uri="{FF2B5EF4-FFF2-40B4-BE49-F238E27FC236}">
+                <a16:creationId xmlns:a16="http://schemas.microsoft.com/office/drawing/2014/main" id="{D9CC281D-8652-9341-94A2-4B1D4C019692}"/>
+              </a:ext>
+            </a:extLst>
+          </p:cNvPr>
+          <p:cNvSpPr txBox="1"/>
+          <p:nvPr/>
+        </p:nvSpPr>
+        <p:spPr>
+          <a:xfrm>
+            <a:off x="2296834" y="2368422"/>
+            <a:ext cx="1264257" cy="369332"/>
+          </a:xfrm>
+          <a:prstGeom prst="rect">
+            <a:avLst/>
+          </a:prstGeom>
+          <a:noFill/>
+        </p:spPr>
+        <p:txBody>
+          <a:bodyPr wrap="square" rtlCol="0">
+            <a:spAutoFit/>
+          </a:bodyPr>
+          <a:lstStyle/>
+          <a:p>
+            <a:r>
+              <a:rPr lang="en-US" dirty="0"/>
+              <a:t>Indus</a:t>
+            </a:r>
+          </a:p>
+        </p:txBody>
+      </p:sp>
+      <p:sp>
+        <p:nvSpPr>
+          <p:cNvPr id="7" name="TextBox 6">
+            <a:extLst>
+              <a:ext uri="{FF2B5EF4-FFF2-40B4-BE49-F238E27FC236}">
+                <a16:creationId xmlns:a16="http://schemas.microsoft.com/office/drawing/2014/main" id="{0BF26869-3BAE-A44F-A525-7C5959B832CF}"/>
+              </a:ext>
+            </a:extLst>
+          </p:cNvPr>
+          <p:cNvSpPr txBox="1"/>
+          <p:nvPr/>
+        </p:nvSpPr>
+        <p:spPr>
+          <a:xfrm>
+            <a:off x="9138152" y="3804716"/>
+            <a:ext cx="1264257" cy="369332"/>
+          </a:xfrm>
+          <a:prstGeom prst="rect">
+            <a:avLst/>
+          </a:prstGeom>
+          <a:noFill/>
+        </p:spPr>
+        <p:txBody>
+          <a:bodyPr wrap="square" rtlCol="0">
+            <a:spAutoFit/>
+          </a:bodyPr>
+          <a:lstStyle/>
+          <a:p>
+            <a:r>
+              <a:rPr lang="en-US" dirty="0"/>
+              <a:t>Chenab</a:t>
+            </a:r>
+          </a:p>
+        </p:txBody>
+      </p:sp>
+      <p:sp>
+        <p:nvSpPr>
+          <p:cNvPr id="9" name="TextBox 8">
+            <a:extLst>
+              <a:ext uri="{FF2B5EF4-FFF2-40B4-BE49-F238E27FC236}">
+                <a16:creationId xmlns:a16="http://schemas.microsoft.com/office/drawing/2014/main" id="{1F065FCF-203F-D14E-8246-1321D29E0267}"/>
+              </a:ext>
+            </a:extLst>
+          </p:cNvPr>
+          <p:cNvSpPr txBox="1"/>
+          <p:nvPr/>
+        </p:nvSpPr>
+        <p:spPr>
+          <a:xfrm>
+            <a:off x="9138153" y="4829211"/>
+            <a:ext cx="1264257" cy="369332"/>
+          </a:xfrm>
+          <a:prstGeom prst="rect">
+            <a:avLst/>
+          </a:prstGeom>
+          <a:noFill/>
+        </p:spPr>
+        <p:txBody>
+          <a:bodyPr wrap="square" rtlCol="0">
+            <a:spAutoFit/>
+          </a:bodyPr>
+          <a:lstStyle/>
+          <a:p>
+            <a:r>
+              <a:rPr lang="en-US" dirty="0" err="1"/>
+              <a:t>Satluj</a:t>
+            </a:r>
+            <a:endParaRPr lang="en-US" dirty="0"/>
+          </a:p>
+        </p:txBody>
+      </p:sp>
+      <p:cxnSp>
+        <p:nvCxnSpPr>
+          <p:cNvPr id="11" name="Straight Connector 10">
+            <a:extLst>
+              <a:ext uri="{FF2B5EF4-FFF2-40B4-BE49-F238E27FC236}">
+                <a16:creationId xmlns:a16="http://schemas.microsoft.com/office/drawing/2014/main" id="{DCE360DF-6993-524C-BDE4-DE48D791C78D}"/>
+              </a:ext>
+            </a:extLst>
+          </p:cNvPr>
+          <p:cNvCxnSpPr>
+            <a:cxnSpLocks/>
+          </p:cNvCxnSpPr>
+          <p:nvPr/>
+        </p:nvCxnSpPr>
+        <p:spPr>
+          <a:xfrm>
+            <a:off x="2796988" y="2737754"/>
+            <a:ext cx="1864659" cy="1066962"/>
+          </a:xfrm>
+          <a:prstGeom prst="line">
+            <a:avLst/>
+          </a:prstGeom>
+          <a:ln w="12700">
+            <a:tailEnd type="triangle"/>
+          </a:ln>
+        </p:spPr>
+        <p:style>
+          <a:lnRef idx="1">
+            <a:schemeClr val="dk1"/>
+          </a:lnRef>
+          <a:fillRef idx="0">
+            <a:schemeClr val="dk1"/>
+          </a:fillRef>
+          <a:effectRef idx="0">
+            <a:schemeClr val="dk1"/>
+          </a:effectRef>
+          <a:fontRef idx="minor">
+            <a:schemeClr val="tx1"/>
+          </a:fontRef>
+        </p:style>
+      </p:cxnSp>
+      <p:cxnSp>
+        <p:nvCxnSpPr>
+          <p:cNvPr id="13" name="Straight Connector 12">
+            <a:extLst>
+              <a:ext uri="{FF2B5EF4-FFF2-40B4-BE49-F238E27FC236}">
+                <a16:creationId xmlns:a16="http://schemas.microsoft.com/office/drawing/2014/main" id="{00CAB84F-FC30-1442-B491-4B1E40D0802D}"/>
+              </a:ext>
+            </a:extLst>
+          </p:cNvPr>
+          <p:cNvCxnSpPr>
+            <a:cxnSpLocks/>
+            <a:endCxn id="9" idx="1"/>
+          </p:cNvCxnSpPr>
+          <p:nvPr/>
+        </p:nvCxnSpPr>
+        <p:spPr>
+          <a:xfrm>
+            <a:off x="7073153" y="2737754"/>
+            <a:ext cx="2065000" cy="2276123"/>
+          </a:xfrm>
+          <a:prstGeom prst="line">
+            <a:avLst/>
+          </a:prstGeom>
+          <a:ln w="12700">
+            <a:headEnd type="triangle"/>
+          </a:ln>
+        </p:spPr>
+        <p:style>
+          <a:lnRef idx="1">
+            <a:schemeClr val="dk1"/>
+          </a:lnRef>
+          <a:fillRef idx="0">
+            <a:schemeClr val="dk1"/>
+          </a:fillRef>
+          <a:effectRef idx="0">
+            <a:schemeClr val="dk1"/>
+          </a:effectRef>
+          <a:fontRef idx="minor">
+            <a:schemeClr val="tx1"/>
+          </a:fontRef>
+        </p:style>
+      </p:cxnSp>
+      <p:cxnSp>
+        <p:nvCxnSpPr>
+          <p:cNvPr id="15" name="Straight Connector 14">
+            <a:extLst>
+              <a:ext uri="{FF2B5EF4-FFF2-40B4-BE49-F238E27FC236}">
+                <a16:creationId xmlns:a16="http://schemas.microsoft.com/office/drawing/2014/main" id="{43C3C7A6-230B-FD40-B2E0-07E324A047C0}"/>
+              </a:ext>
+            </a:extLst>
+          </p:cNvPr>
+          <p:cNvCxnSpPr>
+            <a:cxnSpLocks/>
+          </p:cNvCxnSpPr>
+          <p:nvPr/>
+        </p:nvCxnSpPr>
+        <p:spPr>
+          <a:xfrm>
+            <a:off x="7001435" y="1972235"/>
+            <a:ext cx="2136716" cy="1878898"/>
+          </a:xfrm>
+          <a:prstGeom prst="line">
+            <a:avLst/>
+          </a:prstGeom>
+          <a:ln w="12700">
+            <a:headEnd type="triangle"/>
+            <a:tailEnd type="none"/>
+          </a:ln>
+        </p:spPr>
+        <p:style>
+          <a:lnRef idx="1">
+            <a:schemeClr val="dk1"/>
+          </a:lnRef>
+          <a:fillRef idx="0">
+            <a:schemeClr val="dk1"/>
+          </a:fillRef>
+          <a:effectRef idx="0">
+            <a:schemeClr val="dk1"/>
+          </a:effectRef>
+          <a:fontRef idx="minor">
+            <a:schemeClr val="tx1"/>
+          </a:fontRef>
+        </p:style>
+      </p:cxnSp>
+      <p:sp>
+        <p:nvSpPr>
+          <p:cNvPr id="17" name="TextBox 16">
+            <a:extLst>
+              <a:ext uri="{FF2B5EF4-FFF2-40B4-BE49-F238E27FC236}">
+                <a16:creationId xmlns:a16="http://schemas.microsoft.com/office/drawing/2014/main" id="{3742F655-3700-0D4E-8A10-5E4AD10D82B7}"/>
+              </a:ext>
+            </a:extLst>
+          </p:cNvPr>
+          <p:cNvSpPr txBox="1"/>
+          <p:nvPr/>
+        </p:nvSpPr>
+        <p:spPr>
+          <a:xfrm>
+            <a:off x="9080604" y="5472817"/>
+            <a:ext cx="1264257" cy="369332"/>
+          </a:xfrm>
+          <a:prstGeom prst="rect">
+            <a:avLst/>
+          </a:prstGeom>
+          <a:noFill/>
+        </p:spPr>
+        <p:txBody>
+          <a:bodyPr wrap="square" rtlCol="0">
+            <a:spAutoFit/>
+          </a:bodyPr>
+          <a:lstStyle/>
+          <a:p>
+            <a:r>
+              <a:rPr lang="en-US" dirty="0" err="1"/>
+              <a:t>Panjnad</a:t>
+            </a:r>
+            <a:endParaRPr lang="en-US" dirty="0"/>
+          </a:p>
+        </p:txBody>
+      </p:sp>
+      <p:cxnSp>
+        <p:nvCxnSpPr>
+          <p:cNvPr id="18" name="Straight Connector 17">
+            <a:extLst>
+              <a:ext uri="{FF2B5EF4-FFF2-40B4-BE49-F238E27FC236}">
+                <a16:creationId xmlns:a16="http://schemas.microsoft.com/office/drawing/2014/main" id="{1C8D9833-3E6F-6340-9B11-AF52BD9F4A7C}"/>
+              </a:ext>
+            </a:extLst>
+          </p:cNvPr>
+          <p:cNvCxnSpPr>
+            <a:cxnSpLocks/>
+          </p:cNvCxnSpPr>
+          <p:nvPr/>
+        </p:nvCxnSpPr>
+        <p:spPr>
+          <a:xfrm>
+            <a:off x="6517341" y="2868706"/>
+            <a:ext cx="2563263" cy="2735819"/>
+          </a:xfrm>
+          <a:prstGeom prst="line">
+            <a:avLst/>
+          </a:prstGeom>
+          <a:ln w="12700">
+            <a:headEnd type="triangle"/>
+            <a:tailEnd type="none"/>
+          </a:ln>
+        </p:spPr>
+        <p:style>
+          <a:lnRef idx="1">
+            <a:schemeClr val="dk1"/>
+          </a:lnRef>
+          <a:fillRef idx="0">
+            <a:schemeClr val="dk1"/>
+          </a:fillRef>
+          <a:effectRef idx="0">
+            <a:schemeClr val="dk1"/>
+          </a:effectRef>
+          <a:fontRef idx="minor">
+            <a:schemeClr val="tx1"/>
+          </a:fontRef>
+        </p:style>
+      </p:cxnSp>
+      <p:sp>
+        <p:nvSpPr>
+          <p:cNvPr id="22" name="TextBox 21">
+            <a:extLst>
+              <a:ext uri="{FF2B5EF4-FFF2-40B4-BE49-F238E27FC236}">
+                <a16:creationId xmlns:a16="http://schemas.microsoft.com/office/drawing/2014/main" id="{82D444A7-6995-524E-9138-DDD675620724}"/>
+              </a:ext>
+            </a:extLst>
+          </p:cNvPr>
+          <p:cNvSpPr txBox="1"/>
+          <p:nvPr/>
+        </p:nvSpPr>
+        <p:spPr>
+          <a:xfrm>
+            <a:off x="2289040" y="5013877"/>
+            <a:ext cx="1264257" cy="646331"/>
+          </a:xfrm>
+          <a:prstGeom prst="rect">
+            <a:avLst/>
+          </a:prstGeom>
+          <a:noFill/>
+        </p:spPr>
+        <p:txBody>
+          <a:bodyPr wrap="square" rtlCol="0">
+            <a:spAutoFit/>
+          </a:bodyPr>
+          <a:lstStyle/>
+          <a:p>
+            <a:r>
+              <a:rPr lang="en-US" dirty="0" err="1"/>
+              <a:t>Kotri</a:t>
+            </a:r>
+            <a:r>
+              <a:rPr lang="en-US" dirty="0"/>
+              <a:t> Barrage</a:t>
+            </a:r>
+          </a:p>
+        </p:txBody>
+      </p:sp>
+      <p:cxnSp>
+        <p:nvCxnSpPr>
+          <p:cNvPr id="23" name="Straight Connector 22">
+            <a:extLst>
+              <a:ext uri="{FF2B5EF4-FFF2-40B4-BE49-F238E27FC236}">
+                <a16:creationId xmlns:a16="http://schemas.microsoft.com/office/drawing/2014/main" id="{00E40D9E-1304-5347-9091-125593D4DDA2}"/>
+              </a:ext>
+            </a:extLst>
+          </p:cNvPr>
+          <p:cNvCxnSpPr>
+            <a:cxnSpLocks/>
+          </p:cNvCxnSpPr>
+          <p:nvPr/>
+        </p:nvCxnSpPr>
+        <p:spPr>
+          <a:xfrm>
+            <a:off x="3007111" y="5203816"/>
+            <a:ext cx="1537995" cy="201902"/>
+          </a:xfrm>
+          <a:prstGeom prst="line">
+            <a:avLst/>
+          </a:prstGeom>
+          <a:ln w="12700">
+            <a:tailEnd type="triangle"/>
+          </a:ln>
+        </p:spPr>
+        <p:style>
+          <a:lnRef idx="1">
+            <a:schemeClr val="dk1"/>
+          </a:lnRef>
+          <a:fillRef idx="0">
+            <a:schemeClr val="dk1"/>
+          </a:fillRef>
+          <a:effectRef idx="0">
+            <a:schemeClr val="dk1"/>
+          </a:effectRef>
+          <a:fontRef idx="minor">
+            <a:schemeClr val="tx1"/>
+          </a:fontRef>
+        </p:style>
+      </p:cxnSp>
+      <p:sp>
+        <p:nvSpPr>
+          <p:cNvPr id="25" name="Rectangle 24">
+            <a:extLst>
+              <a:ext uri="{FF2B5EF4-FFF2-40B4-BE49-F238E27FC236}">
+                <a16:creationId xmlns:a16="http://schemas.microsoft.com/office/drawing/2014/main" id="{07977E60-F0CD-8A47-87A8-5D7FA6EE0263}"/>
+              </a:ext>
+            </a:extLst>
+          </p:cNvPr>
+          <p:cNvSpPr/>
+          <p:nvPr/>
+        </p:nvSpPr>
+        <p:spPr>
+          <a:xfrm>
+            <a:off x="4052046" y="6174730"/>
+            <a:ext cx="276269" cy="279859"/>
+          </a:xfrm>
+          <a:prstGeom prst="rect">
+            <a:avLst/>
+          </a:prstGeom>
+          <a:noFill/>
+          <a:ln w="25400">
+            <a:solidFill>
+              <a:srgbClr val="FF0000"/>
+            </a:solidFill>
+          </a:ln>
+        </p:spPr>
+        <p:style>
+          <a:lnRef idx="2">
+            <a:schemeClr val="accent1">
+              <a:shade val="50000"/>
+            </a:schemeClr>
+          </a:lnRef>
+          <a:fillRef idx="1">
+            <a:schemeClr val="accent1"/>
+          </a:fillRef>
+          <a:effectRef idx="0">
+            <a:schemeClr val="accent1"/>
+          </a:effectRef>
+          <a:fontRef idx="minor">
+            <a:schemeClr val="lt1"/>
+          </a:fontRef>
+        </p:style>
+        <p:txBody>
+          <a:bodyPr rtlCol="0" anchor="ctr"/>
+          <a:lstStyle/>
+          <a:p>
+            <a:pPr algn="ctr"/>
+            <a:endParaRPr lang="en-US"/>
+          </a:p>
+        </p:txBody>
+      </p:sp>
+      <p:sp>
+        <p:nvSpPr>
+          <p:cNvPr id="26" name="Rectangle 25">
+            <a:extLst>
+              <a:ext uri="{FF2B5EF4-FFF2-40B4-BE49-F238E27FC236}">
+                <a16:creationId xmlns:a16="http://schemas.microsoft.com/office/drawing/2014/main" id="{A852AFAB-8864-3B4D-98B6-7D66DCA22436}"/>
+              </a:ext>
+            </a:extLst>
+          </p:cNvPr>
+          <p:cNvSpPr/>
+          <p:nvPr/>
+        </p:nvSpPr>
+        <p:spPr>
+          <a:xfrm>
+            <a:off x="4938188" y="6174730"/>
+            <a:ext cx="277284" cy="281598"/>
+          </a:xfrm>
+          <a:prstGeom prst="rect">
+            <a:avLst/>
+          </a:prstGeom>
+          <a:noFill/>
+          <a:ln w="25400">
+            <a:solidFill>
+              <a:schemeClr val="accent1"/>
+            </a:solidFill>
+          </a:ln>
+        </p:spPr>
+        <p:style>
+          <a:lnRef idx="2">
+            <a:schemeClr val="accent1">
+              <a:shade val="50000"/>
+            </a:schemeClr>
+          </a:lnRef>
+          <a:fillRef idx="1">
+            <a:schemeClr val="accent1"/>
+          </a:fillRef>
+          <a:effectRef idx="0">
+            <a:schemeClr val="accent1"/>
+          </a:effectRef>
+          <a:fontRef idx="minor">
+            <a:schemeClr val="lt1"/>
+          </a:fontRef>
+        </p:style>
+        <p:txBody>
+          <a:bodyPr rtlCol="0" anchor="ctr"/>
+          <a:lstStyle/>
+          <a:p>
+            <a:pPr algn="ctr"/>
+            <a:endParaRPr lang="en-US"/>
+          </a:p>
+        </p:txBody>
+      </p:sp>
+    </p:spTree>
+    <p:extLst>
+      <p:ext uri="{BB962C8B-B14F-4D97-AF65-F5344CB8AC3E}">
+        <p14:creationId xmlns:p14="http://schemas.microsoft.com/office/powerpoint/2010/main" val="4127124351"/>
+      </p:ext>
+    </p:extLst>
+  </p:cSld>
+  <p:clrMapOvr>
+    <a:masterClrMapping/>
+  </p:clrMapOvr>
+</p:sld>
+</file>
+
+<file path=ppt/slides/slide12.xml><?xml version="1.0" encoding="utf-8"?>
+<p:sld xmlns:a="http://schemas.openxmlformats.org/drawingml/2006/main" xmlns:r="http://schemas.openxmlformats.org/officeDocument/2006/relationships" xmlns:p="http://schemas.openxmlformats.org/presentationml/2006/main">
+  <p:cSld>
+    <p:spTree>
+      <p:nvGrpSpPr>
+        <p:cNvPr id="1" name=""/>
+        <p:cNvGrpSpPr/>
+        <p:nvPr/>
+      </p:nvGrpSpPr>
+      <p:grpSpPr>
+        <a:xfrm>
+          <a:off x="0" y="0"/>
+          <a:ext cx="0" cy="0"/>
+          <a:chOff x="0" y="0"/>
+          <a:chExt cx="0" cy="0"/>
+        </a:xfrm>
+      </p:grpSpPr>
+      <p:pic>
+        <p:nvPicPr>
+          <p:cNvPr id="5" name="Picture 4">
+            <a:extLst>
+              <a:ext uri="{FF2B5EF4-FFF2-40B4-BE49-F238E27FC236}">
+                <a16:creationId xmlns:a16="http://schemas.microsoft.com/office/drawing/2014/main" id="{621F5711-2901-E94E-8571-B619FD3EC978}"/>
+              </a:ext>
+            </a:extLst>
+          </p:cNvPr>
+          <p:cNvPicPr>
+            <a:picLocks noChangeAspect="1"/>
+          </p:cNvPicPr>
+          <p:nvPr/>
+        </p:nvPicPr>
+        <p:blipFill>
+          <a:blip r:embed="rId2"/>
+          <a:stretch>
+            <a:fillRect/>
+          </a:stretch>
+        </p:blipFill>
+        <p:spPr>
+          <a:xfrm>
+            <a:off x="2196352" y="0"/>
+            <a:ext cx="8002505" cy="6688165"/>
+          </a:xfrm>
+          <a:prstGeom prst="rect">
+            <a:avLst/>
+          </a:prstGeom>
+        </p:spPr>
+      </p:pic>
+      <p:grpSp>
+        <p:nvGrpSpPr>
+          <p:cNvPr id="20" name="Group 19">
+            <a:extLst>
+              <a:ext uri="{FF2B5EF4-FFF2-40B4-BE49-F238E27FC236}">
+                <a16:creationId xmlns:a16="http://schemas.microsoft.com/office/drawing/2014/main" id="{E5EE4BBA-E32C-9549-9AE8-D7F3C589F8C0}"/>
+              </a:ext>
+            </a:extLst>
+          </p:cNvPr>
+          <p:cNvGrpSpPr/>
+          <p:nvPr/>
+        </p:nvGrpSpPr>
+        <p:grpSpPr>
+          <a:xfrm>
+            <a:off x="6598023" y="5100918"/>
+            <a:ext cx="3325906" cy="1264024"/>
+            <a:chOff x="7485529" y="4052047"/>
+            <a:chExt cx="3325906" cy="1264024"/>
+          </a:xfrm>
+        </p:grpSpPr>
+        <p:sp>
+          <p:nvSpPr>
+            <p:cNvPr id="6" name="Rectangle 5">
+              <a:extLst>
+                <a:ext uri="{FF2B5EF4-FFF2-40B4-BE49-F238E27FC236}">
+                  <a16:creationId xmlns:a16="http://schemas.microsoft.com/office/drawing/2014/main" id="{0516BC02-EFC8-454B-A8C4-8D56A56B382A}"/>
+                </a:ext>
+              </a:extLst>
+            </p:cNvPr>
+            <p:cNvSpPr/>
+            <p:nvPr/>
+          </p:nvSpPr>
+          <p:spPr>
+            <a:xfrm>
+              <a:off x="7485529" y="4052047"/>
+              <a:ext cx="3325906" cy="1264024"/>
+            </a:xfrm>
+            <a:prstGeom prst="rect">
+              <a:avLst/>
+            </a:prstGeom>
+            <a:noFill/>
+            <a:ln w="15875">
+              <a:solidFill>
+                <a:schemeClr val="tx1"/>
+              </a:solidFill>
+            </a:ln>
+          </p:spPr>
+          <p:style>
+            <a:lnRef idx="2">
+              <a:schemeClr val="accent1">
+                <a:shade val="50000"/>
+              </a:schemeClr>
+            </a:lnRef>
+            <a:fillRef idx="1">
+              <a:schemeClr val="accent1"/>
+            </a:fillRef>
+            <a:effectRef idx="0">
+              <a:schemeClr val="accent1"/>
+            </a:effectRef>
+            <a:fontRef idx="minor">
+              <a:schemeClr val="lt1"/>
+            </a:fontRef>
+          </p:style>
+          <p:txBody>
+            <a:bodyPr rtlCol="0" anchor="ctr"/>
+            <a:lstStyle/>
+            <a:p>
+              <a:r>
+                <a:rPr lang="en-US" dirty="0">
+                  <a:solidFill>
+                    <a:schemeClr val="tx1"/>
+                  </a:solidFill>
+                </a:rPr>
+                <a:t>Basin (1/16 </a:t>
+              </a:r>
+              <a:r>
+                <a:rPr lang="en-US" dirty="0" err="1">
+                  <a:solidFill>
+                    <a:schemeClr val="tx1"/>
+                  </a:solidFill>
+                </a:rPr>
+                <a:t>deg</a:t>
+              </a:r>
+              <a:r>
+                <a:rPr lang="en-US" dirty="0">
+                  <a:solidFill>
+                    <a:schemeClr val="tx1"/>
+                  </a:solidFill>
+                </a:rPr>
+                <a:t>)</a:t>
+              </a:r>
+            </a:p>
+            <a:p>
+              <a:r>
+                <a:rPr lang="en-US" dirty="0">
+                  <a:solidFill>
+                    <a:schemeClr val="tx1"/>
+                  </a:solidFill>
+                </a:rPr>
+                <a:t>Basin (30 as)</a:t>
+              </a:r>
+            </a:p>
+            <a:p>
+              <a:r>
+                <a:rPr lang="en-US" dirty="0">
+                  <a:solidFill>
+                    <a:schemeClr val="tx1"/>
+                  </a:solidFill>
+                </a:rPr>
+                <a:t>River network (1/16 </a:t>
+              </a:r>
+              <a:r>
+                <a:rPr lang="en-US" dirty="0" err="1">
+                  <a:solidFill>
+                    <a:schemeClr val="tx1"/>
+                  </a:solidFill>
+                </a:rPr>
+                <a:t>deg</a:t>
+              </a:r>
+              <a:r>
+                <a:rPr lang="en-US" dirty="0">
+                  <a:solidFill>
+                    <a:schemeClr val="tx1"/>
+                  </a:solidFill>
+                </a:rPr>
+                <a:t>)</a:t>
+              </a:r>
+            </a:p>
+            <a:p>
+              <a:r>
+                <a:rPr lang="en-US" dirty="0">
+                  <a:solidFill>
+                    <a:schemeClr val="tx1"/>
+                  </a:solidFill>
+                </a:rPr>
+                <a:t>River network (30 as)</a:t>
+              </a:r>
+            </a:p>
+          </p:txBody>
+        </p:sp>
+        <p:cxnSp>
+          <p:nvCxnSpPr>
+            <p:cNvPr id="8" name="Straight Connector 7">
+              <a:extLst>
+                <a:ext uri="{FF2B5EF4-FFF2-40B4-BE49-F238E27FC236}">
+                  <a16:creationId xmlns:a16="http://schemas.microsoft.com/office/drawing/2014/main" id="{87764BD0-A83E-BC4F-84C1-54D1C6C102A9}"/>
+                </a:ext>
+              </a:extLst>
+            </p:cNvPr>
+            <p:cNvCxnSpPr>
+              <a:cxnSpLocks/>
+            </p:cNvCxnSpPr>
+            <p:nvPr/>
+          </p:nvCxnSpPr>
+          <p:spPr>
+            <a:xfrm>
+              <a:off x="10004612" y="4294094"/>
+              <a:ext cx="673858" cy="0"/>
+            </a:xfrm>
+            <a:prstGeom prst="line">
+              <a:avLst/>
+            </a:prstGeom>
+            <a:ln w="38100">
+              <a:solidFill>
+                <a:srgbClr val="FF38FF"/>
+              </a:solidFill>
+            </a:ln>
+          </p:spPr>
+          <p:style>
+            <a:lnRef idx="1">
+              <a:schemeClr val="accent1"/>
+            </a:lnRef>
+            <a:fillRef idx="0">
+              <a:schemeClr val="accent1"/>
+            </a:fillRef>
+            <a:effectRef idx="0">
+              <a:schemeClr val="accent1"/>
+            </a:effectRef>
+            <a:fontRef idx="minor">
+              <a:schemeClr val="tx1"/>
+            </a:fontRef>
+          </p:style>
+        </p:cxnSp>
+        <p:cxnSp>
+          <p:nvCxnSpPr>
+            <p:cNvPr id="9" name="Straight Connector 8">
+              <a:extLst>
+                <a:ext uri="{FF2B5EF4-FFF2-40B4-BE49-F238E27FC236}">
+                  <a16:creationId xmlns:a16="http://schemas.microsoft.com/office/drawing/2014/main" id="{C6550AA7-BF8A-1C45-9190-BCFFF2F8EB2B}"/>
+                </a:ext>
+              </a:extLst>
+            </p:cNvPr>
+            <p:cNvCxnSpPr>
+              <a:cxnSpLocks/>
+            </p:cNvCxnSpPr>
+            <p:nvPr/>
+          </p:nvCxnSpPr>
+          <p:spPr>
+            <a:xfrm>
+              <a:off x="10004612" y="4840941"/>
+              <a:ext cx="678340" cy="0"/>
+            </a:xfrm>
+            <a:prstGeom prst="line">
+              <a:avLst/>
+            </a:prstGeom>
+            <a:ln w="38100">
+              <a:solidFill>
+                <a:schemeClr val="tx1"/>
+              </a:solidFill>
+            </a:ln>
+          </p:spPr>
+          <p:style>
+            <a:lnRef idx="1">
+              <a:schemeClr val="accent1"/>
+            </a:lnRef>
+            <a:fillRef idx="0">
+              <a:schemeClr val="accent1"/>
+            </a:fillRef>
+            <a:effectRef idx="0">
+              <a:schemeClr val="accent1"/>
+            </a:effectRef>
+            <a:fontRef idx="minor">
+              <a:schemeClr val="tx1"/>
+            </a:fontRef>
+          </p:style>
+        </p:cxnSp>
+        <p:cxnSp>
+          <p:nvCxnSpPr>
+            <p:cNvPr id="10" name="Straight Connector 9">
+              <a:extLst>
+                <a:ext uri="{FF2B5EF4-FFF2-40B4-BE49-F238E27FC236}">
+                  <a16:creationId xmlns:a16="http://schemas.microsoft.com/office/drawing/2014/main" id="{B0172BE2-5C17-F940-A8E4-A71D8A4C21DC}"/>
+                </a:ext>
+              </a:extLst>
+            </p:cNvPr>
+            <p:cNvCxnSpPr>
+              <a:cxnSpLocks/>
+            </p:cNvCxnSpPr>
+            <p:nvPr/>
+          </p:nvCxnSpPr>
+          <p:spPr>
+            <a:xfrm>
+              <a:off x="10004612" y="5118846"/>
+              <a:ext cx="678340" cy="0"/>
+            </a:xfrm>
+            <a:prstGeom prst="line">
+              <a:avLst/>
+            </a:prstGeom>
+            <a:ln w="38100">
+              <a:solidFill>
+                <a:srgbClr val="2944FB"/>
+              </a:solidFill>
+            </a:ln>
+          </p:spPr>
+          <p:style>
+            <a:lnRef idx="1">
+              <a:schemeClr val="accent1"/>
+            </a:lnRef>
+            <a:fillRef idx="0">
+              <a:schemeClr val="accent1"/>
+            </a:fillRef>
+            <a:effectRef idx="0">
+              <a:schemeClr val="accent1"/>
+            </a:effectRef>
+            <a:fontRef idx="minor">
+              <a:schemeClr val="tx1"/>
+            </a:fontRef>
+          </p:style>
+        </p:cxnSp>
+        <p:cxnSp>
+          <p:nvCxnSpPr>
+            <p:cNvPr id="11" name="Straight Connector 10">
+              <a:extLst>
+                <a:ext uri="{FF2B5EF4-FFF2-40B4-BE49-F238E27FC236}">
+                  <a16:creationId xmlns:a16="http://schemas.microsoft.com/office/drawing/2014/main" id="{2C419480-0A91-EA40-9794-BE17162E94D2}"/>
+                </a:ext>
+              </a:extLst>
+            </p:cNvPr>
+            <p:cNvCxnSpPr>
+              <a:cxnSpLocks/>
+            </p:cNvCxnSpPr>
+            <p:nvPr/>
+          </p:nvCxnSpPr>
+          <p:spPr>
+            <a:xfrm>
+              <a:off x="10004612" y="4527176"/>
+              <a:ext cx="673858" cy="0"/>
+            </a:xfrm>
+            <a:prstGeom prst="line">
+              <a:avLst/>
+            </a:prstGeom>
+            <a:ln w="38100">
+              <a:solidFill>
+                <a:srgbClr val="E5DAE6"/>
+              </a:solidFill>
+            </a:ln>
+          </p:spPr>
+          <p:style>
+            <a:lnRef idx="1">
+              <a:schemeClr val="accent1"/>
+            </a:lnRef>
+            <a:fillRef idx="0">
+              <a:schemeClr val="accent1"/>
+            </a:fillRef>
+            <a:effectRef idx="0">
+              <a:schemeClr val="accent1"/>
+            </a:effectRef>
+            <a:fontRef idx="minor">
+              <a:schemeClr val="tx1"/>
+            </a:fontRef>
+          </p:style>
+        </p:cxnSp>
+      </p:grpSp>
+    </p:spTree>
+    <p:extLst>
+      <p:ext uri="{BB962C8B-B14F-4D97-AF65-F5344CB8AC3E}">
+        <p14:creationId xmlns:p14="http://schemas.microsoft.com/office/powerpoint/2010/main" val="1538553660"/>
+      </p:ext>
+    </p:extLst>
+  </p:cSld>
+  <p:clrMapOvr>
+    <a:masterClrMapping/>
+  </p:clrMapOvr>
+</p:sld>
+</file>
+
+<file path=ppt/slides/slide13.xml><?xml version="1.0" encoding="utf-8"?>
+<p:sld xmlns:a="http://schemas.openxmlformats.org/drawingml/2006/main" xmlns:r="http://schemas.openxmlformats.org/officeDocument/2006/relationships" xmlns:p="http://schemas.openxmlformats.org/presentationml/2006/main">
+  <p:cSld>
+    <p:spTree>
+      <p:nvGrpSpPr>
+        <p:cNvPr id="1" name=""/>
+        <p:cNvGrpSpPr/>
+        <p:nvPr/>
+      </p:nvGrpSpPr>
+      <p:grpSpPr>
+        <a:xfrm>
+          <a:off x="0" y="0"/>
+          <a:ext cx="0" cy="0"/>
+          <a:chOff x="0" y="0"/>
+          <a:chExt cx="0" cy="0"/>
+        </a:xfrm>
+      </p:grpSpPr>
+      <p:grpSp>
+        <p:nvGrpSpPr>
+          <p:cNvPr id="10" name="Group 9">
+            <a:extLst>
+              <a:ext uri="{FF2B5EF4-FFF2-40B4-BE49-F238E27FC236}">
+                <a16:creationId xmlns:a16="http://schemas.microsoft.com/office/drawing/2014/main" id="{B77BC55A-5829-1845-BD34-7A64A1A8AD61}"/>
+              </a:ext>
+            </a:extLst>
+          </p:cNvPr>
+          <p:cNvGrpSpPr/>
+          <p:nvPr/>
+        </p:nvGrpSpPr>
+        <p:grpSpPr>
+          <a:xfrm>
+            <a:off x="-22166" y="0"/>
+            <a:ext cx="9449128" cy="6858000"/>
+            <a:chOff x="1371436" y="0"/>
+            <a:chExt cx="9449128" cy="6858000"/>
+          </a:xfrm>
+        </p:grpSpPr>
+        <p:pic>
+          <p:nvPicPr>
+            <p:cNvPr id="5" name="Picture 4">
+              <a:extLst>
+                <a:ext uri="{FF2B5EF4-FFF2-40B4-BE49-F238E27FC236}">
+                  <a16:creationId xmlns:a16="http://schemas.microsoft.com/office/drawing/2014/main" id="{F3CE7734-CBD4-264A-94AF-A8F3B12959D4}"/>
+                </a:ext>
+              </a:extLst>
+            </p:cNvPr>
+            <p:cNvPicPr>
+              <a:picLocks noChangeAspect="1"/>
+            </p:cNvPicPr>
+            <p:nvPr/>
+          </p:nvPicPr>
+          <p:blipFill>
+            <a:blip r:embed="rId2"/>
+            <a:stretch>
+              <a:fillRect/>
+            </a:stretch>
+          </p:blipFill>
+          <p:spPr>
+            <a:xfrm>
+              <a:off x="1371436" y="0"/>
+              <a:ext cx="9449128" cy="6858000"/>
+            </a:xfrm>
+            <a:prstGeom prst="rect">
+              <a:avLst/>
+            </a:prstGeom>
+          </p:spPr>
+        </p:pic>
+        <p:sp>
+          <p:nvSpPr>
+            <p:cNvPr id="6" name="Rectangle 5">
+              <a:extLst>
+                <a:ext uri="{FF2B5EF4-FFF2-40B4-BE49-F238E27FC236}">
+                  <a16:creationId xmlns:a16="http://schemas.microsoft.com/office/drawing/2014/main" id="{B11A817D-229F-A34B-BA61-30D08BA6253F}"/>
+                </a:ext>
+              </a:extLst>
+            </p:cNvPr>
+            <p:cNvSpPr/>
+            <p:nvPr/>
+          </p:nvSpPr>
+          <p:spPr>
+            <a:xfrm>
+              <a:off x="8690953" y="2472525"/>
+              <a:ext cx="276269" cy="279859"/>
+            </a:xfrm>
+            <a:prstGeom prst="rect">
+              <a:avLst/>
+            </a:prstGeom>
+            <a:noFill/>
+            <a:ln w="25400">
+              <a:solidFill>
+                <a:schemeClr val="accent2"/>
+              </a:solidFill>
+            </a:ln>
+          </p:spPr>
+          <p:style>
+            <a:lnRef idx="2">
+              <a:schemeClr val="accent1">
+                <a:shade val="50000"/>
+              </a:schemeClr>
+            </a:lnRef>
+            <a:fillRef idx="1">
+              <a:schemeClr val="accent1"/>
+            </a:fillRef>
+            <a:effectRef idx="0">
+              <a:schemeClr val="accent1"/>
+            </a:effectRef>
+            <a:fontRef idx="minor">
+              <a:schemeClr val="lt1"/>
+            </a:fontRef>
+          </p:style>
+          <p:txBody>
+            <a:bodyPr rtlCol="0" anchor="ctr"/>
+            <a:lstStyle/>
+            <a:p>
+              <a:pPr algn="ctr"/>
+              <a:endParaRPr lang="en-US"/>
+            </a:p>
+          </p:txBody>
+        </p:sp>
+        <p:sp>
+          <p:nvSpPr>
+            <p:cNvPr id="7" name="Rectangle 6">
+              <a:extLst>
+                <a:ext uri="{FF2B5EF4-FFF2-40B4-BE49-F238E27FC236}">
+                  <a16:creationId xmlns:a16="http://schemas.microsoft.com/office/drawing/2014/main" id="{4568CE80-27D1-EA44-A5F3-F8F0E663C409}"/>
+                </a:ext>
+              </a:extLst>
+            </p:cNvPr>
+            <p:cNvSpPr/>
+            <p:nvPr/>
+          </p:nvSpPr>
+          <p:spPr>
+            <a:xfrm>
+              <a:off x="3824868" y="4754806"/>
+              <a:ext cx="535259" cy="820803"/>
+            </a:xfrm>
+            <a:prstGeom prst="rect">
+              <a:avLst/>
+            </a:prstGeom>
+            <a:noFill/>
+            <a:ln w="25400">
+              <a:solidFill>
+                <a:schemeClr val="accent2"/>
+              </a:solidFill>
+            </a:ln>
+          </p:spPr>
+          <p:style>
+            <a:lnRef idx="2">
+              <a:schemeClr val="accent1">
+                <a:shade val="50000"/>
+              </a:schemeClr>
+            </a:lnRef>
+            <a:fillRef idx="1">
+              <a:schemeClr val="accent1"/>
+            </a:fillRef>
+            <a:effectRef idx="0">
+              <a:schemeClr val="accent1"/>
+            </a:effectRef>
+            <a:fontRef idx="minor">
+              <a:schemeClr val="lt1"/>
+            </a:fontRef>
+          </p:style>
+          <p:txBody>
+            <a:bodyPr rtlCol="0" anchor="ctr"/>
+            <a:lstStyle/>
+            <a:p>
+              <a:pPr algn="ctr"/>
+              <a:endParaRPr lang="en-US"/>
+            </a:p>
+          </p:txBody>
+        </p:sp>
+        <p:sp>
+          <p:nvSpPr>
+            <p:cNvPr id="8" name="Rectangle 7">
+              <a:extLst>
+                <a:ext uri="{FF2B5EF4-FFF2-40B4-BE49-F238E27FC236}">
+                  <a16:creationId xmlns:a16="http://schemas.microsoft.com/office/drawing/2014/main" id="{45D6B0FF-40DE-C84C-8DF0-5B3436CDA1EC}"/>
+                </a:ext>
+              </a:extLst>
+            </p:cNvPr>
+            <p:cNvSpPr/>
+            <p:nvPr/>
+          </p:nvSpPr>
+          <p:spPr>
+            <a:xfrm>
+              <a:off x="8690952" y="3289070"/>
+              <a:ext cx="276269" cy="279859"/>
+            </a:xfrm>
+            <a:prstGeom prst="rect">
+              <a:avLst/>
+            </a:prstGeom>
+            <a:noFill/>
+            <a:ln w="25400">
+              <a:solidFill>
+                <a:schemeClr val="accent2"/>
+              </a:solidFill>
+            </a:ln>
+          </p:spPr>
+          <p:style>
+            <a:lnRef idx="2">
+              <a:schemeClr val="accent1">
+                <a:shade val="50000"/>
+              </a:schemeClr>
+            </a:lnRef>
+            <a:fillRef idx="1">
+              <a:schemeClr val="accent1"/>
+            </a:fillRef>
+            <a:effectRef idx="0">
+              <a:schemeClr val="accent1"/>
+            </a:effectRef>
+            <a:fontRef idx="minor">
+              <a:schemeClr val="lt1"/>
+            </a:fontRef>
+          </p:style>
+          <p:txBody>
+            <a:bodyPr rtlCol="0" anchor="ctr"/>
+            <a:lstStyle/>
+            <a:p>
+              <a:pPr algn="ctr"/>
+              <a:endParaRPr lang="en-US"/>
+            </a:p>
+          </p:txBody>
+        </p:sp>
+        <p:sp>
+          <p:nvSpPr>
+            <p:cNvPr id="9" name="Rectangle 8">
+              <a:extLst>
+                <a:ext uri="{FF2B5EF4-FFF2-40B4-BE49-F238E27FC236}">
+                  <a16:creationId xmlns:a16="http://schemas.microsoft.com/office/drawing/2014/main" id="{4D0A02D6-5799-3943-A2BE-2F8C99EC7937}"/>
+                </a:ext>
+              </a:extLst>
+            </p:cNvPr>
+            <p:cNvSpPr/>
+            <p:nvPr/>
+          </p:nvSpPr>
+          <p:spPr>
+            <a:xfrm>
+              <a:off x="4204010" y="4028900"/>
+              <a:ext cx="669675" cy="559718"/>
+            </a:xfrm>
+            <a:prstGeom prst="rect">
+              <a:avLst/>
+            </a:prstGeom>
+            <a:noFill/>
+            <a:ln w="25400">
+              <a:solidFill>
+                <a:schemeClr val="accent2"/>
+              </a:solidFill>
+            </a:ln>
+          </p:spPr>
+          <p:style>
+            <a:lnRef idx="2">
+              <a:schemeClr val="accent1">
+                <a:shade val="50000"/>
+              </a:schemeClr>
+            </a:lnRef>
+            <a:fillRef idx="1">
+              <a:schemeClr val="accent1"/>
+            </a:fillRef>
+            <a:effectRef idx="0">
+              <a:schemeClr val="accent1"/>
+            </a:effectRef>
+            <a:fontRef idx="minor">
+              <a:schemeClr val="lt1"/>
+            </a:fontRef>
+          </p:style>
+          <p:txBody>
+            <a:bodyPr rtlCol="0" anchor="ctr"/>
+            <a:lstStyle/>
+            <a:p>
+              <a:pPr algn="ctr"/>
+              <a:endParaRPr lang="en-US"/>
+            </a:p>
+          </p:txBody>
+        </p:sp>
+      </p:grpSp>
+      <p:sp>
+        <p:nvSpPr>
+          <p:cNvPr id="20" name="Rectangle 19">
+            <a:extLst>
+              <a:ext uri="{FF2B5EF4-FFF2-40B4-BE49-F238E27FC236}">
+                <a16:creationId xmlns:a16="http://schemas.microsoft.com/office/drawing/2014/main" id="{2FCBA984-314F-B742-8EE3-9EE03C809E89}"/>
+              </a:ext>
+            </a:extLst>
+          </p:cNvPr>
+          <p:cNvSpPr/>
+          <p:nvPr/>
+        </p:nvSpPr>
+        <p:spPr>
+          <a:xfrm>
+            <a:off x="9108575" y="2691856"/>
+            <a:ext cx="2655196" cy="706859"/>
+          </a:xfrm>
+          <a:prstGeom prst="rect">
+            <a:avLst/>
+          </a:prstGeom>
+          <a:noFill/>
+          <a:ln w="25400">
+            <a:solidFill>
+              <a:schemeClr val="accent2"/>
+            </a:solidFill>
+          </a:ln>
+        </p:spPr>
+        <p:style>
+          <a:lnRef idx="2">
+            <a:schemeClr val="accent1">
+              <a:shade val="50000"/>
+            </a:schemeClr>
+          </a:lnRef>
+          <a:fillRef idx="1">
+            <a:schemeClr val="accent1"/>
+          </a:fillRef>
+          <a:effectRef idx="0">
+            <a:schemeClr val="accent1"/>
+          </a:effectRef>
+          <a:fontRef idx="minor">
+            <a:schemeClr val="lt1"/>
+          </a:fontRef>
+        </p:style>
+        <p:txBody>
+          <a:bodyPr rtlCol="0" anchor="ctr"/>
+          <a:lstStyle/>
+          <a:p>
+            <a:pPr algn="ctr"/>
+            <a:endParaRPr lang="en-US"/>
+          </a:p>
+        </p:txBody>
+      </p:sp>
+      <p:sp>
+        <p:nvSpPr>
+          <p:cNvPr id="21" name="TextBox 20">
+            <a:extLst>
+              <a:ext uri="{FF2B5EF4-FFF2-40B4-BE49-F238E27FC236}">
+                <a16:creationId xmlns:a16="http://schemas.microsoft.com/office/drawing/2014/main" id="{33CE58B2-223C-C945-8AC2-AD04DDF2EADF}"/>
+              </a:ext>
+            </a:extLst>
+          </p:cNvPr>
+          <p:cNvSpPr txBox="1"/>
+          <p:nvPr/>
+        </p:nvSpPr>
+        <p:spPr>
+          <a:xfrm>
+            <a:off x="9182098" y="2752384"/>
+            <a:ext cx="2581673" cy="646331"/>
+          </a:xfrm>
+          <a:prstGeom prst="rect">
+            <a:avLst/>
+          </a:prstGeom>
+          <a:noFill/>
+        </p:spPr>
+        <p:txBody>
+          <a:bodyPr wrap="square" rtlCol="0">
+            <a:spAutoFit/>
+          </a:bodyPr>
+          <a:lstStyle/>
+          <a:p>
+            <a:r>
+              <a:rPr lang="en-US" dirty="0"/>
+              <a:t>Locations for manual flow direction corrections</a:t>
+            </a:r>
+          </a:p>
+        </p:txBody>
+      </p:sp>
+      <p:sp>
+        <p:nvSpPr>
+          <p:cNvPr id="22" name="TextBox 21">
+            <a:extLst>
+              <a:ext uri="{FF2B5EF4-FFF2-40B4-BE49-F238E27FC236}">
+                <a16:creationId xmlns:a16="http://schemas.microsoft.com/office/drawing/2014/main" id="{53F95F9B-F6B5-EF44-B0C9-8ECD210815BC}"/>
+              </a:ext>
+            </a:extLst>
+          </p:cNvPr>
+          <p:cNvSpPr txBox="1"/>
+          <p:nvPr/>
+        </p:nvSpPr>
+        <p:spPr>
+          <a:xfrm>
+            <a:off x="9182098" y="1520604"/>
+            <a:ext cx="2581673" cy="923330"/>
+          </a:xfrm>
+          <a:prstGeom prst="rect">
+            <a:avLst/>
+          </a:prstGeom>
+          <a:noFill/>
+        </p:spPr>
+        <p:txBody>
+          <a:bodyPr wrap="square" rtlCol="0">
+            <a:spAutoFit/>
+          </a:bodyPr>
+          <a:lstStyle/>
+          <a:p>
+            <a:r>
+              <a:rPr lang="en-US" dirty="0"/>
+              <a:t>Coarse flow directions</a:t>
+            </a:r>
+          </a:p>
+          <a:p>
+            <a:r>
+              <a:rPr lang="en-US" dirty="0"/>
+              <a:t>”True” basin boundary</a:t>
+            </a:r>
+          </a:p>
+          <a:p>
+            <a:r>
+              <a:rPr lang="en-US" dirty="0"/>
+              <a:t>“True” river network</a:t>
+            </a:r>
+          </a:p>
+        </p:txBody>
+      </p:sp>
+      <p:sp>
+        <p:nvSpPr>
+          <p:cNvPr id="23" name="TextBox 22">
+            <a:extLst>
+              <a:ext uri="{FF2B5EF4-FFF2-40B4-BE49-F238E27FC236}">
+                <a16:creationId xmlns:a16="http://schemas.microsoft.com/office/drawing/2014/main" id="{663DE72A-A5C8-9842-AE0E-6636BC1A24D8}"/>
+              </a:ext>
+            </a:extLst>
+          </p:cNvPr>
+          <p:cNvSpPr txBox="1"/>
+          <p:nvPr/>
+        </p:nvSpPr>
+        <p:spPr>
+          <a:xfrm>
+            <a:off x="9276718" y="3934857"/>
+            <a:ext cx="2581673" cy="1200329"/>
+          </a:xfrm>
+          <a:prstGeom prst="rect">
+            <a:avLst/>
+          </a:prstGeom>
+          <a:noFill/>
+        </p:spPr>
+        <p:txBody>
+          <a:bodyPr wrap="square" rtlCol="0">
+            <a:spAutoFit/>
+          </a:bodyPr>
+          <a:lstStyle/>
+          <a:p>
+            <a:r>
+              <a:rPr lang="en-US" dirty="0"/>
+              <a:t>No need to correct this area – it is not actually part of the IRB, according to Khan et al. (2014)</a:t>
+            </a:r>
+          </a:p>
+        </p:txBody>
+      </p:sp>
+      <p:cxnSp>
+        <p:nvCxnSpPr>
+          <p:cNvPr id="24" name="Straight Connector 23">
+            <a:extLst>
+              <a:ext uri="{FF2B5EF4-FFF2-40B4-BE49-F238E27FC236}">
+                <a16:creationId xmlns:a16="http://schemas.microsoft.com/office/drawing/2014/main" id="{E85C6078-8915-A647-B4B6-29B9D4C16FAB}"/>
+              </a:ext>
+            </a:extLst>
+          </p:cNvPr>
+          <p:cNvCxnSpPr>
+            <a:cxnSpLocks/>
+          </p:cNvCxnSpPr>
+          <p:nvPr/>
+        </p:nvCxnSpPr>
+        <p:spPr>
+          <a:xfrm flipH="1" flipV="1">
+            <a:off x="7573619" y="2691856"/>
+            <a:ext cx="1703100" cy="1616903"/>
+          </a:xfrm>
+          <a:prstGeom prst="line">
+            <a:avLst/>
+          </a:prstGeom>
+          <a:ln w="12700">
+            <a:tailEnd type="triangle"/>
+          </a:ln>
+        </p:spPr>
+        <p:style>
+          <a:lnRef idx="1">
+            <a:schemeClr val="dk1"/>
+          </a:lnRef>
+          <a:fillRef idx="0">
+            <a:schemeClr val="dk1"/>
+          </a:fillRef>
+          <a:effectRef idx="0">
+            <a:schemeClr val="dk1"/>
+          </a:effectRef>
+          <a:fontRef idx="minor">
+            <a:schemeClr val="tx1"/>
+          </a:fontRef>
+        </p:style>
+      </p:cxnSp>
+    </p:spTree>
+    <p:extLst>
+      <p:ext uri="{BB962C8B-B14F-4D97-AF65-F5344CB8AC3E}">
+        <p14:creationId xmlns:p14="http://schemas.microsoft.com/office/powerpoint/2010/main" val="1318925573"/>
       </p:ext>
     </p:extLst>
   </p:cSld>
@@ -3228,13 +5258,6 @@
   <p:clrMapOvr>
     <a:masterClrMapping/>
   </p:clrMapOvr>
-  <p:timing>
-    <p:tnLst>
-      <p:par>
-        <p:cTn id="1" dur="indefinite" restart="never" nodeType="tmRoot"/>
-      </p:par>
-    </p:tnLst>
-  </p:timing>
 </p:sld>
 </file>
 
@@ -3278,18 +5301,17 @@
           <a:lstStyle/>
           <a:p>
             <a:r>
-              <a:rPr lang="en-US" sz="2600" dirty="0" smtClean="0"/>
+              <a:rPr lang="en-US" sz="2600" dirty="0"/>
               <a:t>Tuolumne headwater basin </a:t>
             </a:r>
             <a:r>
-              <a:rPr lang="mr-IN" sz="2600" dirty="0" smtClean="0"/>
+              <a:rPr lang="mr-IN" sz="2600" dirty="0"/>
               <a:t>–</a:t>
             </a:r>
             <a:r>
-              <a:rPr lang="en-US" sz="2600" dirty="0" smtClean="0"/>
+              <a:rPr lang="en-US" sz="2600" dirty="0"/>
               <a:t> marked for corrections</a:t>
             </a:r>
-            <a:endParaRPr lang="en-US" sz="2600" dirty="0"/>
           </a:p>
         </p:txBody>
       </p:sp>
@@ -3333,13 +5355,6 @@
   <p:clrMapOvr>
     <a:masterClrMapping/>
   </p:clrMapOvr>
-  <p:timing>
-    <p:tnLst>
-      <p:par>
-        <p:cTn id="1" dur="indefinite" restart="never" nodeType="tmRoot"/>
-      </p:par>
-    </p:tnLst>
-  </p:timing>
 </p:sld>
 </file>
 
@@ -3442,26 +5457,25 @@
           <a:lstStyle/>
           <a:p>
             <a:r>
-              <a:rPr lang="en-US" sz="2600" dirty="0" smtClean="0"/>
+              <a:rPr lang="en-US" sz="2600" dirty="0"/>
               <a:t>Extracted flow directions (it is </a:t>
             </a:r>
             <a:r>
-              <a:rPr lang="en-US" sz="2600" smtClean="0"/>
+              <a:rPr lang="en-US" sz="2600"/>
               <a:t>continuous, but the </a:t>
             </a:r>
             <a:r>
-              <a:rPr lang="en-US" sz="2600" dirty="0" smtClean="0"/>
+              <a:rPr lang="en-US" sz="2600" dirty="0"/>
               <a:t>dark blue for “up” matches </a:t>
             </a:r>
             <a:r>
-              <a:rPr lang="en-US" sz="2600" dirty="0" err="1" smtClean="0"/>
+              <a:rPr lang="en-US" sz="2600" dirty="0" err="1"/>
               <a:t>NaN</a:t>
             </a:r>
             <a:r>
-              <a:rPr lang="en-US" sz="2600" dirty="0" smtClean="0"/>
+              <a:rPr lang="en-US" sz="2600" dirty="0"/>
               <a:t> background color)</a:t>
             </a:r>
-            <a:endParaRPr lang="en-US" sz="2600" dirty="0"/>
           </a:p>
         </p:txBody>
       </p:sp>
@@ -3475,13 +5489,6 @@
   <p:clrMapOvr>
     <a:masterClrMapping/>
   </p:clrMapOvr>
-  <p:timing>
-    <p:tnLst>
-      <p:par>
-        <p:cTn id="1" dur="indefinite" restart="never" nodeType="tmRoot"/>
-      </p:par>
-    </p:tnLst>
-  </p:timing>
 </p:sld>
 </file>
 
@@ -3574,18 +5581,17 @@
           </a:lstStyle>
           <a:p>
             <a:r>
-              <a:rPr lang="en-US" sz="2600" dirty="0" smtClean="0"/>
+              <a:rPr lang="en-US" sz="2600" dirty="0"/>
               <a:t>Tuolumne headwater basin </a:t>
             </a:r>
             <a:r>
-              <a:rPr lang="mr-IN" sz="2600" dirty="0" smtClean="0"/>
+              <a:rPr lang="mr-IN" sz="2600" dirty="0"/>
               <a:t>–</a:t>
             </a:r>
             <a:r>
-              <a:rPr lang="en-US" sz="2600" dirty="0" smtClean="0"/>
+              <a:rPr lang="en-US" sz="2600" dirty="0"/>
               <a:t> after corrections</a:t>
             </a:r>
-            <a:endParaRPr lang="en-US" sz="2600" dirty="0"/>
           </a:p>
         </p:txBody>
       </p:sp>
@@ -3599,13 +5605,6 @@
   <p:clrMapOvr>
     <a:masterClrMapping/>
   </p:clrMapOvr>
-  <p:timing>
-    <p:tnLst>
-      <p:par>
-        <p:cTn id="1" dur="indefinite" restart="never" nodeType="tmRoot"/>
-      </p:par>
-    </p:tnLst>
-  </p:timing>
 </p:sld>
 </file>
 
@@ -3626,25 +5625,6 @@
           <a:chExt cx="0" cy="0"/>
         </a:xfrm>
       </p:grpSpPr>
-      <p:sp>
-        <p:nvSpPr>
-          <p:cNvPr id="2" name="Title 1"/>
-          <p:cNvSpPr>
-            <a:spLocks noGrp="1"/>
-          </p:cNvSpPr>
-          <p:nvPr>
-            <p:ph type="title"/>
-          </p:nvPr>
-        </p:nvSpPr>
-        <p:spPr/>
-        <p:txBody>
-          <a:bodyPr/>
-          <a:lstStyle/>
-          <a:p>
-            <a:endParaRPr lang="en-US"/>
-          </a:p>
-        </p:txBody>
-      </p:sp>
       <p:pic>
         <p:nvPicPr>
           <p:cNvPr id="4" name="Picture 3"/>
@@ -3653,7 +5633,7 @@
           </p:cNvPicPr>
           <p:nvPr/>
         </p:nvPicPr>
-        <p:blipFill>
+        <p:blipFill rotWithShape="1">
           <a:blip r:embed="rId2">
             <a:extLst>
               <a:ext uri="{28A0092B-C50C-407E-A947-70E740481C1C}">
@@ -3661,14 +5641,13 @@
               </a:ext>
             </a:extLst>
           </a:blip>
-          <a:stretch>
-            <a:fillRect/>
-          </a:stretch>
+          <a:srcRect l="9021" t="6202" r="8631" b="7590"/>
+          <a:stretch/>
         </p:blipFill>
         <p:spPr>
           <a:xfrm>
-            <a:off x="5630238" y="678093"/>
-            <a:ext cx="6791218" cy="4895624"/>
+            <a:off x="6658098" y="1531917"/>
+            <a:ext cx="4572000" cy="3450365"/>
           </a:xfrm>
           <a:prstGeom prst="rect">
             <a:avLst/>
@@ -3685,7 +5664,7 @@
             <p:ph idx="1"/>
           </p:nvPr>
         </p:nvPicPr>
-        <p:blipFill>
+        <p:blipFill rotWithShape="1">
           <a:blip r:embed="rId3">
             <a:extLst>
               <a:ext uri="{28A0092B-C50C-407E-A947-70E740481C1C}">
@@ -3693,14 +5672,13 @@
               </a:ext>
             </a:extLst>
           </a:blip>
-          <a:stretch>
-            <a:fillRect/>
-          </a:stretch>
+          <a:srcRect l="9812" t="4090" r="8025" b="7760"/>
+          <a:stretch/>
         </p:blipFill>
         <p:spPr>
           <a:xfrm>
-            <a:off x="0" y="950236"/>
-            <a:ext cx="6173161" cy="4351338"/>
+            <a:off x="1987235" y="1524748"/>
+            <a:ext cx="4572000" cy="3457534"/>
           </a:xfrm>
           <a:prstGeom prst="rect">
             <a:avLst/>
@@ -3717,7 +5695,7 @@
         </p:nvSpPr>
         <p:spPr>
           <a:xfrm>
-            <a:off x="1625509" y="5548621"/>
+            <a:off x="3003047" y="4622346"/>
             <a:ext cx="2922142" cy="1086100"/>
           </a:xfrm>
           <a:prstGeom prst="rect">
@@ -3749,10 +5727,9 @@
           </a:lstStyle>
           <a:p>
             <a:r>
-              <a:rPr lang="en-US" sz="2600" dirty="0" smtClean="0"/>
+              <a:rPr lang="en-US" sz="2600" dirty="0"/>
               <a:t>Before corrections</a:t>
             </a:r>
-            <a:endParaRPr lang="en-US" sz="2600" dirty="0"/>
           </a:p>
         </p:txBody>
       </p:sp>
@@ -3766,7 +5743,7 @@
         </p:nvSpPr>
         <p:spPr>
           <a:xfrm>
-            <a:off x="7564776" y="5548621"/>
+            <a:off x="7849783" y="4622346"/>
             <a:ext cx="2922142" cy="1086100"/>
           </a:xfrm>
           <a:prstGeom prst="rect">
@@ -3798,10 +5775,9 @@
           </a:lstStyle>
           <a:p>
             <a:r>
-              <a:rPr lang="en-US" sz="2600" dirty="0" smtClean="0"/>
+              <a:rPr lang="en-US" sz="2600" dirty="0"/>
               <a:t>After corrections</a:t>
             </a:r>
-            <a:endParaRPr lang="en-US" sz="2600" dirty="0"/>
           </a:p>
         </p:txBody>
       </p:sp>
@@ -3815,13 +5791,6 @@
   <p:clrMapOvr>
     <a:masterClrMapping/>
   </p:clrMapOvr>
-  <p:timing>
-    <p:tnLst>
-      <p:par>
-        <p:cTn id="1" dur="indefinite" restart="never" nodeType="tmRoot"/>
-      </p:par>
-    </p:tnLst>
-  </p:timing>
 </p:sld>
 </file>
 
@@ -3858,10 +5827,9 @@
           <a:lstStyle/>
           <a:p>
             <a:r>
-              <a:rPr lang="en-US" dirty="0" smtClean="0"/>
+              <a:rPr lang="en-US" dirty="0"/>
               <a:t>Future work	</a:t>
             </a:r>
-            <a:endParaRPr lang="en-US" dirty="0"/>
           </a:p>
         </p:txBody>
       </p:sp>
@@ -3881,29 +5849,29 @@
           <a:lstStyle/>
           <a:p>
             <a:r>
-              <a:rPr lang="en-US" dirty="0" smtClean="0"/>
+              <a:rPr lang="en-US" dirty="0"/>
               <a:t>Try out the algorithms from Arora and Harrison (2007) and Wu et al. (2011)</a:t>
             </a:r>
           </a:p>
           <a:p>
             <a:r>
-              <a:rPr lang="en-US" dirty="0" smtClean="0"/>
+              <a:rPr lang="en-US" dirty="0"/>
               <a:t>Address the issue of too many cells being identified as “the wrong direction” compared to the river network -&gt; instead of looking at the direction between the entrance and exit to a grid cell, look at the direction between the centroids of adjacent grid cells. This is a major overhaul, though.</a:t>
             </a:r>
           </a:p>
           <a:p>
             <a:r>
-              <a:rPr lang="en-US" dirty="0" smtClean="0"/>
+              <a:rPr lang="en-US" dirty="0"/>
               <a:t>The most useful part of the code as it is -&gt; flagging cells that flow outside the domain</a:t>
             </a:r>
           </a:p>
           <a:p>
             <a:r>
-              <a:rPr lang="en-US" dirty="0" smtClean="0"/>
+              <a:rPr lang="en-US" dirty="0"/>
               <a:t>Add functionality to </a:t>
             </a:r>
             <a:r>
-              <a:rPr lang="en-US" smtClean="0"/>
+              <a:rPr lang="en-US"/>
               <a:t>detect nontrivial loops</a:t>
             </a:r>
             <a:endParaRPr lang="en-US" dirty="0"/>
@@ -3914,6 +5882,89 @@
     <p:extLst>
       <p:ext uri="{BB962C8B-B14F-4D97-AF65-F5344CB8AC3E}">
         <p14:creationId xmlns:p14="http://schemas.microsoft.com/office/powerpoint/2010/main" val="156246280"/>
+      </p:ext>
+    </p:extLst>
+  </p:cSld>
+  <p:clrMapOvr>
+    <a:masterClrMapping/>
+  </p:clrMapOvr>
+</p:sld>
+</file>
+
+<file path=ppt/slides/slide9.xml><?xml version="1.0" encoding="utf-8"?>
+<p:sld xmlns:a="http://schemas.openxmlformats.org/drawingml/2006/main" xmlns:r="http://schemas.openxmlformats.org/officeDocument/2006/relationships" xmlns:p="http://schemas.openxmlformats.org/presentationml/2006/main">
+  <p:cSld>
+    <p:spTree>
+      <p:nvGrpSpPr>
+        <p:cNvPr id="1" name=""/>
+        <p:cNvGrpSpPr/>
+        <p:nvPr/>
+      </p:nvGrpSpPr>
+      <p:grpSpPr>
+        <a:xfrm>
+          <a:off x="0" y="0"/>
+          <a:ext cx="0" cy="0"/>
+          <a:chOff x="0" y="0"/>
+          <a:chExt cx="0" cy="0"/>
+        </a:xfrm>
+      </p:grpSpPr>
+      <p:sp>
+        <p:nvSpPr>
+          <p:cNvPr id="2" name="Title 1">
+            <a:extLst>
+              <a:ext uri="{FF2B5EF4-FFF2-40B4-BE49-F238E27FC236}">
+                <a16:creationId xmlns:a16="http://schemas.microsoft.com/office/drawing/2014/main" id="{170D4FCE-E484-704D-9E4C-ECACB5A5EEFF}"/>
+              </a:ext>
+            </a:extLst>
+          </p:cNvPr>
+          <p:cNvSpPr>
+            <a:spLocks noGrp="1"/>
+          </p:cNvSpPr>
+          <p:nvPr>
+            <p:ph type="title"/>
+          </p:nvPr>
+        </p:nvSpPr>
+        <p:spPr/>
+        <p:txBody>
+          <a:bodyPr/>
+          <a:lstStyle/>
+          <a:p>
+            <a:r>
+              <a:rPr lang="en-US" dirty="0"/>
+              <a:t>IRB delineation</a:t>
+            </a:r>
+          </a:p>
+        </p:txBody>
+      </p:sp>
+      <p:sp>
+        <p:nvSpPr>
+          <p:cNvPr id="3" name="Content Placeholder 2">
+            <a:extLst>
+              <a:ext uri="{FF2B5EF4-FFF2-40B4-BE49-F238E27FC236}">
+                <a16:creationId xmlns:a16="http://schemas.microsoft.com/office/drawing/2014/main" id="{41918B76-F4D2-7040-9EC1-86DD6A1CD8AC}"/>
+              </a:ext>
+            </a:extLst>
+          </p:cNvPr>
+          <p:cNvSpPr>
+            <a:spLocks noGrp="1"/>
+          </p:cNvSpPr>
+          <p:nvPr>
+            <p:ph idx="1"/>
+          </p:nvPr>
+        </p:nvSpPr>
+        <p:spPr/>
+        <p:txBody>
+          <a:bodyPr/>
+          <a:lstStyle/>
+          <a:p>
+            <a:endParaRPr lang="en-US"/>
+          </a:p>
+        </p:txBody>
+      </p:sp>
+    </p:spTree>
+    <p:extLst>
+      <p:ext uri="{BB962C8B-B14F-4D97-AF65-F5344CB8AC3E}">
+        <p14:creationId xmlns:p14="http://schemas.microsoft.com/office/powerpoint/2010/main" val="580319007"/>
       </p:ext>
     </p:extLst>
   </p:cSld>

</xml_diff>